<commit_message>
Updates to Course 2 from MSFT feedback
</commit_message>
<xml_diff>
--- a/O3652-1 Deep Dive Apps for Office in Outlook/O3652-1 Deep Dive into Apps for Office in Outlook.pptx
+++ b/O3652-1 Deep Dive Apps for Office in Outlook/O3652-1 Deep Dive into Apps for Office in Outlook.pptx
@@ -1474,8 +1474,8 @@
     <dgm:cxn modelId="{EEFCC668-EBB5-44BE-A2CD-B0D5221C0D96}" type="presOf" srcId="{2C926E48-31F3-4DD2-BB06-27D6DB57EFA0}" destId="{4E900734-32CD-4AF7-B40F-CD9DFD7833B5}" srcOrd="1" destOrd="0" presId="urn:microsoft.com/office/officeart/2005/8/layout/venn2"/>
     <dgm:cxn modelId="{C4689E17-783A-4093-A7BE-30BFB34276F8}" type="presOf" srcId="{5FA91774-C770-41B5-A624-BE5975374D47}" destId="{2B472074-5C75-455C-8940-72F53F37BF31}" srcOrd="0" destOrd="0" presId="urn:microsoft.com/office/officeart/2005/8/layout/venn2"/>
     <dgm:cxn modelId="{661480C8-9210-47DD-AA9E-C57494909F17}" type="presOf" srcId="{2C926E48-31F3-4DD2-BB06-27D6DB57EFA0}" destId="{EF94B49F-628D-4D60-879E-6E9A544D2C17}" srcOrd="0" destOrd="0" presId="urn:microsoft.com/office/officeart/2005/8/layout/venn2"/>
+    <dgm:cxn modelId="{D8F85EB0-F8E4-416C-A732-1F35D7EB75A4}" type="presOf" srcId="{1BD07969-C191-417C-A6E4-B99244CFAD5A}" destId="{781D8AD0-3E13-4294-B6C2-44FEDEE8284F}" srcOrd="1" destOrd="0" presId="urn:microsoft.com/office/officeart/2005/8/layout/venn2"/>
     <dgm:cxn modelId="{C07F4D04-B81F-49C9-B597-0014B0B4293C}" srcId="{5FA91774-C770-41B5-A624-BE5975374D47}" destId="{16DC3007-0FD1-4492-97A8-2E91E6D27080}" srcOrd="0" destOrd="0" parTransId="{ED494199-75C2-4B77-B0D4-021CB1074E30}" sibTransId="{171B91CC-2368-4DF6-9509-1D13C250DEBD}"/>
-    <dgm:cxn modelId="{D8F85EB0-F8E4-416C-A732-1F35D7EB75A4}" type="presOf" srcId="{1BD07969-C191-417C-A6E4-B99244CFAD5A}" destId="{781D8AD0-3E13-4294-B6C2-44FEDEE8284F}" srcOrd="1" destOrd="0" presId="urn:microsoft.com/office/officeart/2005/8/layout/venn2"/>
     <dgm:cxn modelId="{B4B6E021-ED79-4AF8-9043-A48E47124034}" srcId="{5FA91774-C770-41B5-A624-BE5975374D47}" destId="{2AF0EA77-4079-4426-B2BC-B32B43437E7C}" srcOrd="1" destOrd="0" parTransId="{577F365D-692B-4747-B567-7FA84654EA98}" sibTransId="{66E6402D-1CEA-47B4-BC12-6C58B075F13C}"/>
     <dgm:cxn modelId="{2EB2386B-AC92-4931-A667-F24D65C1317D}" type="presOf" srcId="{1BD07969-C191-417C-A6E4-B99244CFAD5A}" destId="{35F6297F-4438-47A0-8E6E-5C98D403674F}" srcOrd="0" destOrd="0" presId="urn:microsoft.com/office/officeart/2005/8/layout/venn2"/>
     <dgm:cxn modelId="{3F2F4AD6-5375-49F7-993B-754A666B3734}" type="presParOf" srcId="{2B472074-5C75-455C-8940-72F53F37BF31}" destId="{CAB8A576-D246-4F2B-BCB2-793D63C04576}" srcOrd="0" destOrd="0" presId="urn:microsoft.com/office/officeart/2005/8/layout/venn2"/>
@@ -1509,314 +1509,6 @@
       <dsp:cNvGrpSpPr/>
     </dsp:nvGrpSpPr>
     <dsp:grpSpPr/>
-    <dsp:sp modelId="{D653A868-57E8-4516-AB8D-A6C1D86A0A5C}">
-      <dsp:nvSpPr>
-        <dsp:cNvPr id="0" name=""/>
-        <dsp:cNvSpPr/>
-      </dsp:nvSpPr>
-      <dsp:spPr>
-        <a:xfrm>
-          <a:off x="0" y="306313"/>
-          <a:ext cx="5475619" cy="5475619"/>
-        </a:xfrm>
-        <a:prstGeom prst="ellipse">
-          <a:avLst/>
-        </a:prstGeom>
-        <a:solidFill>
-          <a:schemeClr val="accent1">
-            <a:shade val="50000"/>
-            <a:hueOff val="0"/>
-            <a:satOff val="0"/>
-            <a:lumOff val="0"/>
-            <a:alphaOff val="0"/>
-          </a:schemeClr>
-        </a:solidFill>
-        <a:ln>
-          <a:noFill/>
-        </a:ln>
-        <a:effectLst/>
-        <a:scene3d>
-          <a:camera prst="orthographicFront"/>
-          <a:lightRig rig="chilly" dir="t"/>
-        </a:scene3d>
-        <a:sp3d prstMaterial="translucentPowder">
-          <a:bevelT w="127000" h="25400" prst="softRound"/>
-        </a:sp3d>
-      </dsp:spPr>
-      <dsp:style>
-        <a:lnRef idx="0">
-          <a:scrgbClr r="0" g="0" b="0"/>
-        </a:lnRef>
-        <a:fillRef idx="1">
-          <a:scrgbClr r="0" g="0" b="0"/>
-        </a:fillRef>
-        <a:effectRef idx="0">
-          <a:scrgbClr r="0" g="0" b="0"/>
-        </a:effectRef>
-        <a:fontRef idx="minor">
-          <a:schemeClr val="lt1"/>
-        </a:fontRef>
-      </dsp:style>
-      <dsp:txBody>
-        <a:bodyPr spcFirstLastPara="0" vert="horz" wrap="square" lIns="85344" tIns="85344" rIns="85344" bIns="85344" numCol="1" spcCol="1270" anchor="ctr" anchorCtr="0">
-          <a:noAutofit/>
-        </a:bodyPr>
-        <a:lstStyle/>
-        <a:p>
-          <a:pPr lvl="0" algn="ctr" defTabSz="533400">
-            <a:lnSpc>
-              <a:spcPct val="90000"/>
-            </a:lnSpc>
-            <a:spcBef>
-              <a:spcPct val="0"/>
-            </a:spcBef>
-            <a:spcAft>
-              <a:spcPct val="35000"/>
-            </a:spcAft>
-          </a:pPr>
-          <a:r>
-            <a:rPr lang="en-US" sz="1200" b="1" kern="1200" dirty="0" err="1" smtClean="0"/>
-            <a:t>ReadWriteMailbox</a:t>
-          </a:r>
-          <a:endParaRPr lang="en-US" sz="1200" b="1" kern="1200" dirty="0"/>
-        </a:p>
-      </dsp:txBody>
-      <dsp:txXfrm>
-        <a:off x="1972317" y="580094"/>
-        <a:ext cx="1530983" cy="821342"/>
-      </dsp:txXfrm>
-    </dsp:sp>
-    <dsp:sp modelId="{6027EECE-9C81-40E8-9156-3F19BE750EE8}">
-      <dsp:nvSpPr>
-        <dsp:cNvPr id="0" name=""/>
-        <dsp:cNvSpPr/>
-      </dsp:nvSpPr>
-      <dsp:spPr>
-        <a:xfrm>
-          <a:off x="547561" y="1401437"/>
-          <a:ext cx="4380495" cy="4380495"/>
-        </a:xfrm>
-        <a:prstGeom prst="ellipse">
-          <a:avLst/>
-        </a:prstGeom>
-        <a:solidFill>
-          <a:schemeClr val="accent1">
-            <a:shade val="50000"/>
-            <a:hueOff val="-326127"/>
-            <a:satOff val="-19464"/>
-            <a:lumOff val="24918"/>
-            <a:alphaOff val="0"/>
-          </a:schemeClr>
-        </a:solidFill>
-        <a:ln>
-          <a:noFill/>
-        </a:ln>
-        <a:effectLst/>
-        <a:scene3d>
-          <a:camera prst="orthographicFront"/>
-          <a:lightRig rig="chilly" dir="t"/>
-        </a:scene3d>
-        <a:sp3d prstMaterial="translucentPowder">
-          <a:bevelT w="127000" h="25400" prst="softRound"/>
-        </a:sp3d>
-      </dsp:spPr>
-      <dsp:style>
-        <a:lnRef idx="0">
-          <a:scrgbClr r="0" g="0" b="0"/>
-        </a:lnRef>
-        <a:fillRef idx="1">
-          <a:scrgbClr r="0" g="0" b="0"/>
-        </a:fillRef>
-        <a:effectRef idx="0">
-          <a:scrgbClr r="0" g="0" b="0"/>
-        </a:effectRef>
-        <a:fontRef idx="minor">
-          <a:schemeClr val="lt1"/>
-        </a:fontRef>
-      </dsp:style>
-      <dsp:txBody>
-        <a:bodyPr spcFirstLastPara="0" vert="horz" wrap="square" lIns="85344" tIns="85344" rIns="85344" bIns="85344" numCol="1" spcCol="1270" anchor="ctr" anchorCtr="0">
-          <a:noAutofit/>
-        </a:bodyPr>
-        <a:lstStyle/>
-        <a:p>
-          <a:pPr lvl="0" algn="ctr" defTabSz="533400">
-            <a:lnSpc>
-              <a:spcPct val="90000"/>
-            </a:lnSpc>
-            <a:spcBef>
-              <a:spcPct val="0"/>
-            </a:spcBef>
-            <a:spcAft>
-              <a:spcPct val="35000"/>
-            </a:spcAft>
-          </a:pPr>
-          <a:r>
-            <a:rPr lang="en-US" sz="1200" b="1" kern="1200" dirty="0" err="1" smtClean="0"/>
-            <a:t>ReadWriteItem</a:t>
-          </a:r>
-          <a:endParaRPr lang="en-US" sz="1200" b="1" kern="1200" dirty="0"/>
-        </a:p>
-      </dsp:txBody>
-      <dsp:txXfrm>
-        <a:off x="1972317" y="1664267"/>
-        <a:ext cx="1530983" cy="788489"/>
-      </dsp:txXfrm>
-    </dsp:sp>
-    <dsp:sp modelId="{35F6297F-4438-47A0-8E6E-5C98D403674F}">
-      <dsp:nvSpPr>
-        <dsp:cNvPr id="0" name=""/>
-        <dsp:cNvSpPr/>
-      </dsp:nvSpPr>
-      <dsp:spPr>
-        <a:xfrm>
-          <a:off x="1095123" y="2496561"/>
-          <a:ext cx="3285371" cy="3285371"/>
-        </a:xfrm>
-        <a:prstGeom prst="ellipse">
-          <a:avLst/>
-        </a:prstGeom>
-        <a:solidFill>
-          <a:schemeClr val="accent1">
-            <a:shade val="50000"/>
-            <a:hueOff val="-652254"/>
-            <a:satOff val="-38927"/>
-            <a:lumOff val="49835"/>
-            <a:alphaOff val="0"/>
-          </a:schemeClr>
-        </a:solidFill>
-        <a:ln>
-          <a:noFill/>
-        </a:ln>
-        <a:effectLst/>
-        <a:scene3d>
-          <a:camera prst="orthographicFront"/>
-          <a:lightRig rig="chilly" dir="t"/>
-        </a:scene3d>
-        <a:sp3d prstMaterial="translucentPowder">
-          <a:bevelT w="127000" h="25400" prst="softRound"/>
-        </a:sp3d>
-      </dsp:spPr>
-      <dsp:style>
-        <a:lnRef idx="0">
-          <a:scrgbClr r="0" g="0" b="0"/>
-        </a:lnRef>
-        <a:fillRef idx="1">
-          <a:scrgbClr r="0" g="0" b="0"/>
-        </a:fillRef>
-        <a:effectRef idx="0">
-          <a:scrgbClr r="0" g="0" b="0"/>
-        </a:effectRef>
-        <a:fontRef idx="minor">
-          <a:schemeClr val="lt1"/>
-        </a:fontRef>
-      </dsp:style>
-      <dsp:txBody>
-        <a:bodyPr spcFirstLastPara="0" vert="horz" wrap="square" lIns="85344" tIns="85344" rIns="85344" bIns="85344" numCol="1" spcCol="1270" anchor="ctr" anchorCtr="0">
-          <a:noAutofit/>
-        </a:bodyPr>
-        <a:lstStyle/>
-        <a:p>
-          <a:pPr lvl="0" algn="ctr" defTabSz="533400">
-            <a:lnSpc>
-              <a:spcPct val="90000"/>
-            </a:lnSpc>
-            <a:spcBef>
-              <a:spcPct val="0"/>
-            </a:spcBef>
-            <a:spcAft>
-              <a:spcPct val="35000"/>
-            </a:spcAft>
-          </a:pPr>
-          <a:r>
-            <a:rPr lang="en-US" sz="1200" b="1" kern="1200" dirty="0" err="1" smtClean="0"/>
-            <a:t>ReadItem</a:t>
-          </a:r>
-          <a:endParaRPr lang="en-US" sz="1200" b="1" kern="1200" dirty="0"/>
-        </a:p>
-      </dsp:txBody>
-      <dsp:txXfrm>
-        <a:off x="1972317" y="2742964"/>
-        <a:ext cx="1530983" cy="739208"/>
-      </dsp:txXfrm>
-    </dsp:sp>
-    <dsp:sp modelId="{EF94B49F-628D-4D60-879E-6E9A544D2C17}">
-      <dsp:nvSpPr>
-        <dsp:cNvPr id="0" name=""/>
-        <dsp:cNvSpPr/>
-      </dsp:nvSpPr>
-      <dsp:spPr>
-        <a:xfrm>
-          <a:off x="1642685" y="3591685"/>
-          <a:ext cx="2190247" cy="2190247"/>
-        </a:xfrm>
-        <a:prstGeom prst="ellipse">
-          <a:avLst/>
-        </a:prstGeom>
-        <a:solidFill>
-          <a:schemeClr val="accent1">
-            <a:shade val="50000"/>
-            <a:hueOff val="-326127"/>
-            <a:satOff val="-19464"/>
-            <a:lumOff val="24918"/>
-            <a:alphaOff val="0"/>
-          </a:schemeClr>
-        </a:solidFill>
-        <a:ln>
-          <a:noFill/>
-        </a:ln>
-        <a:effectLst/>
-        <a:scene3d>
-          <a:camera prst="orthographicFront"/>
-          <a:lightRig rig="chilly" dir="t"/>
-        </a:scene3d>
-        <a:sp3d prstMaterial="translucentPowder">
-          <a:bevelT w="127000" h="25400" prst="softRound"/>
-        </a:sp3d>
-      </dsp:spPr>
-      <dsp:style>
-        <a:lnRef idx="0">
-          <a:scrgbClr r="0" g="0" b="0"/>
-        </a:lnRef>
-        <a:fillRef idx="1">
-          <a:scrgbClr r="0" g="0" b="0"/>
-        </a:fillRef>
-        <a:effectRef idx="0">
-          <a:scrgbClr r="0" g="0" b="0"/>
-        </a:effectRef>
-        <a:fontRef idx="minor">
-          <a:schemeClr val="lt1"/>
-        </a:fontRef>
-      </dsp:style>
-      <dsp:txBody>
-        <a:bodyPr spcFirstLastPara="0" vert="horz" wrap="square" lIns="85344" tIns="85344" rIns="85344" bIns="85344" numCol="1" spcCol="1270" anchor="ctr" anchorCtr="0">
-          <a:noAutofit/>
-        </a:bodyPr>
-        <a:lstStyle/>
-        <a:p>
-          <a:pPr lvl="0" algn="ctr" defTabSz="533400">
-            <a:lnSpc>
-              <a:spcPct val="90000"/>
-            </a:lnSpc>
-            <a:spcBef>
-              <a:spcPct val="0"/>
-            </a:spcBef>
-            <a:spcAft>
-              <a:spcPct val="35000"/>
-            </a:spcAft>
-          </a:pPr>
-          <a:r>
-            <a:rPr lang="en-US" sz="1200" b="1" kern="1200" dirty="0" smtClean="0"/>
-            <a:t>Restricted</a:t>
-          </a:r>
-          <a:endParaRPr lang="en-US" sz="1200" b="1" kern="1200" dirty="0"/>
-        </a:p>
-      </dsp:txBody>
-      <dsp:txXfrm>
-        <a:off x="1963440" y="4139247"/>
-        <a:ext cx="1548738" cy="1095123"/>
-      </dsp:txXfrm>
-    </dsp:sp>
   </dsp:spTree>
 </dsp:drawing>
 </file>
@@ -3680,7 +3372,7 @@
           <a:p>
             <a:fld id="{DE219B1A-AE41-483B-A766-69B9363DDA6A}" type="datetimeFigureOut">
               <a:rPr lang="en-US" smtClean="0"/>
-              <a:t>8/28/2014</a:t>
+              <a:t>9/12/2014</a:t>
             </a:fld>
             <a:endParaRPr lang="en-US"/>
           </a:p>
@@ -3962,7 +3654,7 @@
           <a:p>
             <a:fld id="{D51B1278-D92B-4AF3-A9C1-71DD298190CE}" type="datetimeFigureOut">
               <a:rPr lang="en-US" smtClean="0"/>
-              <a:t>8/28/2014</a:t>
+              <a:t>9/12/2014</a:t>
             </a:fld>
             <a:endParaRPr lang="en-US"/>
           </a:p>
@@ -4567,7 +4259,7 @@
           <a:p>
             <a:fld id="{7A3BA087-ABFA-42C9-8B8A-7950120FBE65}" type="datetime1">
               <a:rPr lang="en-US" smtClean="0"/>
-              <a:t>8/28/2014</a:t>
+              <a:t>9/12/2014</a:t>
             </a:fld>
             <a:endParaRPr lang="en-US"/>
           </a:p>
@@ -4876,7 +4568,7 @@
           <a:p>
             <a:fld id="{4B1E4AE6-B13F-4455-827C-35C498DD3E04}" type="datetime1">
               <a:rPr lang="en-US" smtClean="0"/>
-              <a:t>8/28/2014</a:t>
+              <a:t>9/12/2014</a:t>
             </a:fld>
             <a:endParaRPr lang="en-US"/>
           </a:p>
@@ -5174,7 +4866,7 @@
           <a:p>
             <a:fld id="{185BCF2C-AA67-48B1-AD72-80C5E220758E}" type="datetime1">
               <a:rPr lang="en-US" smtClean="0"/>
-              <a:t>8/28/2014</a:t>
+              <a:t>9/12/2014</a:t>
             </a:fld>
             <a:endParaRPr lang="en-US"/>
           </a:p>
@@ -5676,7 +5368,7 @@
           <a:p>
             <a:fld id="{5C4C0152-C767-4F4A-A84E-F34607155542}" type="datetime1">
               <a:rPr lang="en-US" smtClean="0"/>
-              <a:t>8/28/2014</a:t>
+              <a:t>9/12/2014</a:t>
             </a:fld>
             <a:endParaRPr lang="en-US"/>
           </a:p>
@@ -6069,7 +5761,7 @@
           <a:p>
             <a:fld id="{227E14BA-F5CB-4FDA-977E-0AE0D03BD4E1}" type="datetime1">
               <a:rPr lang="en-US" smtClean="0"/>
-              <a:t>8/28/2014</a:t>
+              <a:t>9/12/2014</a:t>
             </a:fld>
             <a:endParaRPr lang="en-US"/>
           </a:p>
@@ -6374,7 +6066,7 @@
                 </a:solidFill>
               </a:rPr>
               <a:pPr/>
-              <a:t>8/28/2014</a:t>
+              <a:t>9/12/2014</a:t>
             </a:fld>
             <a:endParaRPr lang="en-US" dirty="0" smtClean="0">
               <a:solidFill>
@@ -6714,7 +6406,7 @@
           <a:p>
             <a:fld id="{75A03793-8374-4148-9C5A-EA8E2C02D1EC}" type="datetime1">
               <a:rPr lang="en-US" smtClean="0"/>
-              <a:t>8/28/2014</a:t>
+              <a:t>9/12/2014</a:t>
             </a:fld>
             <a:endParaRPr lang="en-US"/>
           </a:p>
@@ -7104,7 +6796,7 @@
           <a:p>
             <a:fld id="{2AF2876C-2158-44F3-80AA-BEDEEF8C7569}" type="datetime1">
               <a:rPr lang="en-US" smtClean="0"/>
-              <a:t>8/28/2014</a:t>
+              <a:t>9/12/2014</a:t>
             </a:fld>
             <a:endParaRPr lang="en-US"/>
           </a:p>
@@ -7490,7 +7182,7 @@
           <a:p>
             <a:fld id="{EAD7A89E-846B-4FE8-B9EA-B63663179E34}" type="datetime1">
               <a:rPr lang="en-US" smtClean="0"/>
-              <a:t>8/28/2014</a:t>
+              <a:t>9/12/2014</a:t>
             </a:fld>
             <a:endParaRPr lang="en-US"/>
           </a:p>
@@ -7760,7 +7452,7 @@
           <a:p>
             <a:fld id="{0E7B7B8A-9CC6-46BA-81D2-0A245DFE466A}" type="datetime1">
               <a:rPr lang="en-US" smtClean="0"/>
-              <a:t>8/28/2014</a:t>
+              <a:t>9/12/2014</a:t>
             </a:fld>
             <a:endParaRPr lang="en-US"/>
           </a:p>
@@ -8020,7 +7712,7 @@
           <a:p>
             <a:fld id="{B079C3B8-7366-4A44-A34B-3977080C19E7}" type="datetime1">
               <a:rPr lang="en-US" smtClean="0"/>
-              <a:t>8/28/2014</a:t>
+              <a:t>9/12/2014</a:t>
             </a:fld>
             <a:endParaRPr lang="en-US" dirty="0"/>
           </a:p>
@@ -8247,7 +7939,7 @@
           <a:p>
             <a:fld id="{1F10EAFE-4303-434D-A8ED-C6F76942E47D}" type="datetime1">
               <a:rPr lang="en-US" smtClean="0"/>
-              <a:t>8/28/2014</a:t>
+              <a:t>9/12/2014</a:t>
             </a:fld>
             <a:endParaRPr lang="en-US"/>
           </a:p>
@@ -8794,7 +8486,7 @@
           <a:p>
             <a:fld id="{0BB6559B-C68D-49B4-97AE-9BB74C417927}" type="datetime1">
               <a:rPr lang="en-US" smtClean="0"/>
-              <a:t>8/28/2014</a:t>
+              <a:t>9/12/2014</a:t>
             </a:fld>
             <a:endParaRPr lang="en-US"/>
           </a:p>
@@ -8957,7 +8649,7 @@
           <a:p>
             <a:fld id="{015232D4-6E30-4A26-A2CA-8531DCB72EA6}" type="datetime1">
               <a:rPr lang="en-US" smtClean="0"/>
-              <a:t>8/28/2014</a:t>
+              <a:t>9/12/2014</a:t>
             </a:fld>
             <a:endParaRPr lang="en-US"/>
           </a:p>
@@ -9337,7 +9029,7 @@
           <a:p>
             <a:fld id="{9FEEF74C-1007-402E-B0A6-22E0FEB3AB9E}" type="datetime1">
               <a:rPr lang="en-US" smtClean="0"/>
-              <a:t>8/28/2014</a:t>
+              <a:t>9/12/2014</a:t>
             </a:fld>
             <a:endParaRPr lang="en-US"/>
           </a:p>
@@ -9570,7 +9262,7 @@
           <a:p>
             <a:fld id="{0963315D-FADD-47D1-B04E-85DCA5AF53D6}" type="datetime1">
               <a:rPr lang="en-US" smtClean="0"/>
-              <a:t>8/28/2014</a:t>
+              <a:t>9/12/2014</a:t>
             </a:fld>
             <a:endParaRPr lang="en-US"/>
           </a:p>
@@ -10104,7 +9796,7 @@
                 </a:solidFill>
               </a:rPr>
               <a:pPr/>
-              <a:t>8/28/2014</a:t>
+              <a:t>9/12/2014</a:t>
             </a:fld>
             <a:endParaRPr lang="en-US" smtClean="0">
               <a:solidFill>
@@ -10335,7 +10027,7 @@
           <a:p>
             <a:fld id="{7C2288F8-45A3-451F-B966-C98685AAD3AF}" type="datetime1">
               <a:rPr lang="en-US" smtClean="0"/>
-              <a:t>8/28/2014</a:t>
+              <a:t>9/12/2014</a:t>
             </a:fld>
             <a:endParaRPr lang="en-US"/>
           </a:p>
@@ -21232,7 +20924,7 @@
               </a:spcBef>
             </a:pPr>
             <a:r>
-              <a:rPr lang="en-US" dirty="0" smtClean="0"/>
+              <a:rPr lang="en-US" sz="3600" dirty="0" smtClean="0"/>
               <a:t>Mail Apps require Exchange 2013</a:t>
             </a:r>
           </a:p>
@@ -21243,14 +20935,14 @@
               </a:spcBef>
             </a:pPr>
             <a:r>
-              <a:rPr lang="en-US" dirty="0"/>
+              <a:rPr lang="en-US" sz="2000" dirty="0"/>
               <a:t>Exchange Server hosts </a:t>
             </a:r>
             <a:r>
-              <a:rPr lang="en-US" dirty="0" smtClean="0"/>
+              <a:rPr lang="en-US" sz="2000" dirty="0" smtClean="0"/>
               <a:t>users mailbox</a:t>
             </a:r>
-            <a:endParaRPr lang="en-US" dirty="0"/>
+            <a:endParaRPr lang="en-US" sz="2000" dirty="0"/>
           </a:p>
           <a:p>
             <a:pPr lvl="1">
@@ -21259,7 +20951,7 @@
               </a:spcBef>
             </a:pPr>
             <a:r>
-              <a:rPr lang="en-US" dirty="0" smtClean="0"/>
+              <a:rPr lang="en-US" sz="2000" dirty="0" smtClean="0"/>
               <a:t>Exchange Server hosts app manifest files</a:t>
             </a:r>
           </a:p>
@@ -21270,15 +20962,15 @@
               </a:spcBef>
             </a:pPr>
             <a:r>
-              <a:rPr lang="en-US" dirty="0" smtClean="0"/>
+              <a:rPr lang="en-US" sz="2000" dirty="0" smtClean="0"/>
               <a:t>Web server hosts HTML for </a:t>
             </a:r>
             <a:r>
-              <a:rPr lang="en-US" dirty="0"/>
+              <a:rPr lang="en-US" sz="2000" dirty="0"/>
               <a:t>M</a:t>
             </a:r>
             <a:r>
-              <a:rPr lang="en-US" dirty="0" smtClean="0"/>
+              <a:rPr lang="en-US" sz="2000" dirty="0" smtClean="0"/>
               <a:t>ail App</a:t>
             </a:r>
           </a:p>
@@ -21289,7 +20981,7 @@
               </a:spcBef>
             </a:pPr>
             <a:r>
-              <a:rPr lang="en-US" dirty="0" smtClean="0"/>
+              <a:rPr lang="en-US" sz="2000" dirty="0" smtClean="0"/>
               <a:t>Mail App can make callback to Web server</a:t>
             </a:r>
           </a:p>
@@ -21300,14 +20992,14 @@
               </a:spcBef>
             </a:pPr>
             <a:r>
-              <a:rPr lang="en-US" dirty="0" smtClean="0"/>
+              <a:rPr lang="en-US" sz="2000" dirty="0" smtClean="0"/>
               <a:t>Mail App can call Exchange Web Services (EWS)</a:t>
             </a:r>
             <a:br>
-              <a:rPr lang="en-US" dirty="0" smtClean="0"/>
+              <a:rPr lang="en-US" sz="2000" dirty="0" smtClean="0"/>
             </a:br>
             <a:r>
-              <a:rPr lang="en-US" sz="1800" i="1" dirty="0">
+              <a:rPr lang="en-US" sz="1600" i="1" dirty="0">
                 <a:solidFill>
                   <a:schemeClr val="bg2">
                     <a:lumMod val="75000"/>
@@ -21317,7 +21009,7 @@
               <a:t>EWS calls </a:t>
             </a:r>
             <a:r>
-              <a:rPr lang="en-US" sz="1800" i="1" dirty="0" smtClean="0">
+              <a:rPr lang="en-US" sz="1600" i="1" dirty="0" smtClean="0">
                 <a:solidFill>
                   <a:schemeClr val="bg2">
                     <a:lumMod val="75000"/>
@@ -21333,250 +21025,538 @@
                 <a:spcPts val="1200"/>
               </a:spcBef>
             </a:pPr>
-            <a:endParaRPr lang="en-US" dirty="0" smtClean="0"/>
+            <a:endParaRPr lang="en-US" sz="3600" dirty="0" smtClean="0"/>
           </a:p>
         </p:txBody>
       </p:sp>
-      <p:pic>
-        <p:nvPicPr>
-          <p:cNvPr id="1026" name="Picture 2"/>
-          <p:cNvPicPr>
-            <a:picLocks noChangeAspect="1" noChangeArrowheads="1"/>
-          </p:cNvPicPr>
+      <p:grpSp>
+        <p:nvGrpSpPr>
+          <p:cNvPr id="9" name="Group 8"/>
+          <p:cNvGrpSpPr/>
           <p:nvPr/>
-        </p:nvPicPr>
-        <p:blipFill>
-          <a:blip r:embed="rId3">
-            <a:extLst>
-              <a:ext uri="{28A0092B-C50C-407E-A947-70E740481C1C}">
-                <a14:useLocalDpi xmlns:a14="http://schemas.microsoft.com/office/drawing/2010/main" val="0"/>
-              </a:ext>
-            </a:extLst>
-          </a:blip>
-          <a:srcRect/>
-          <a:stretch>
-            <a:fillRect/>
-          </a:stretch>
-        </p:blipFill>
-        <p:spPr bwMode="auto">
+        </p:nvGrpSpPr>
+        <p:grpSpPr>
           <a:xfrm>
-            <a:off x="7851317" y="1449341"/>
-            <a:ext cx="4156604" cy="3652045"/>
+            <a:off x="6109082" y="532901"/>
+            <a:ext cx="5559043" cy="4663608"/>
+            <a:chOff x="556810" y="1772053"/>
+            <a:chExt cx="5559043" cy="4663608"/>
           </a:xfrm>
-          <a:prstGeom prst="rect">
-            <a:avLst/>
-          </a:prstGeom>
-          <a:noFill/>
-          <a:ln>
-            <a:noFill/>
-          </a:ln>
-          <a:effectLst/>
-          <a:extLst>
-            <a:ext uri="{909E8E84-426E-40DD-AFC4-6F175D3DCCD1}">
-              <a14:hiddenFill xmlns:a14="http://schemas.microsoft.com/office/drawing/2010/main">
+        </p:grpSpPr>
+        <p:sp>
+          <p:nvSpPr>
+            <p:cNvPr id="10" name="Rectangle 9"/>
+            <p:cNvSpPr/>
+            <p:nvPr/>
+          </p:nvSpPr>
+          <p:spPr>
+            <a:xfrm>
+              <a:off x="3371600" y="4115228"/>
+              <a:ext cx="2288634" cy="1992571"/>
+            </a:xfrm>
+            <a:prstGeom prst="rect">
+              <a:avLst/>
+            </a:prstGeom>
+            <a:solidFill>
+              <a:schemeClr val="bg1">
+                <a:lumMod val="95000"/>
+              </a:schemeClr>
+            </a:solidFill>
+          </p:spPr>
+          <p:style>
+            <a:lnRef idx="2">
+              <a:schemeClr val="accent5"/>
+            </a:lnRef>
+            <a:fillRef idx="1">
+              <a:schemeClr val="lt1"/>
+            </a:fillRef>
+            <a:effectRef idx="0">
+              <a:schemeClr val="accent5"/>
+            </a:effectRef>
+            <a:fontRef idx="minor">
+              <a:schemeClr val="dk1"/>
+            </a:fontRef>
+          </p:style>
+          <p:txBody>
+            <a:bodyPr lIns="91429" tIns="45715" rIns="91429" bIns="45715" rtlCol="0" anchor="t"/>
+            <a:lstStyle/>
+            <a:p>
+              <a:r>
+                <a:rPr lang="en-US" dirty="0" smtClean="0">
+                  <a:solidFill>
+                    <a:srgbClr val="595959"/>
+                  </a:solidFill>
+                  <a:latin typeface="+mj-lt"/>
+                </a:rPr>
+                <a:t>Web Server</a:t>
+              </a:r>
+            </a:p>
+            <a:p>
+              <a:pPr marL="285750" indent="-285750">
+                <a:buFont typeface="Arial" panose="020B0604020202020204" pitchFamily="34" charset="0"/>
+                <a:buChar char="•"/>
+              </a:pPr>
+              <a:r>
+                <a:rPr lang="en-US" sz="1200" dirty="0" smtClean="0">
+                  <a:solidFill>
+                    <a:srgbClr val="595959"/>
+                  </a:solidFill>
+                  <a:latin typeface="+mj-lt"/>
+                </a:rPr>
+                <a:t>Hosts HTML, CSS and JavaScript</a:t>
+              </a:r>
+            </a:p>
+            <a:p>
+              <a:pPr marL="285750" indent="-285750">
+                <a:buFont typeface="Arial" panose="020B0604020202020204" pitchFamily="34" charset="0"/>
+                <a:buChar char="•"/>
+              </a:pPr>
+              <a:r>
+                <a:rPr lang="en-US" sz="1200" dirty="0" smtClean="0">
+                  <a:solidFill>
+                    <a:srgbClr val="595959"/>
+                  </a:solidFill>
+                  <a:latin typeface="+mj-lt"/>
+                </a:rPr>
+                <a:t>Supports CSOM/REST calls from app</a:t>
+              </a:r>
+              <a:endParaRPr lang="en-US" sz="1200" dirty="0">
                 <a:solidFill>
-                  <a:schemeClr val="accent1"/>
+                  <a:srgbClr val="595959"/>
                 </a:solidFill>
-              </a14:hiddenFill>
-            </a:ext>
-            <a:ext uri="{91240B29-F687-4F45-9708-019B960494DF}">
-              <a14:hiddenLine xmlns:a14="http://schemas.microsoft.com/office/drawing/2010/main" w="9525">
+                <a:latin typeface="+mj-lt"/>
+              </a:endParaRPr>
+            </a:p>
+          </p:txBody>
+        </p:sp>
+        <p:sp>
+          <p:nvSpPr>
+            <p:cNvPr id="11" name="Rectangle 10"/>
+            <p:cNvSpPr/>
+            <p:nvPr/>
+          </p:nvSpPr>
+          <p:spPr>
+            <a:xfrm>
+              <a:off x="3371601" y="1772053"/>
+              <a:ext cx="2288633" cy="1572887"/>
+            </a:xfrm>
+            <a:prstGeom prst="rect">
+              <a:avLst/>
+            </a:prstGeom>
+            <a:solidFill>
+              <a:schemeClr val="bg1">
+                <a:lumMod val="95000"/>
+              </a:schemeClr>
+            </a:solidFill>
+          </p:spPr>
+          <p:style>
+            <a:lnRef idx="2">
+              <a:schemeClr val="accent5"/>
+            </a:lnRef>
+            <a:fillRef idx="1">
+              <a:schemeClr val="lt1"/>
+            </a:fillRef>
+            <a:effectRef idx="0">
+              <a:schemeClr val="accent5"/>
+            </a:effectRef>
+            <a:fontRef idx="minor">
+              <a:schemeClr val="dk1"/>
+            </a:fontRef>
+          </p:style>
+          <p:txBody>
+            <a:bodyPr lIns="91429" tIns="45715" rIns="91429" bIns="45715" rtlCol="0" anchor="t"/>
+            <a:lstStyle/>
+            <a:p>
+              <a:r>
+                <a:rPr lang="en-US" dirty="0" smtClean="0">
+                  <a:solidFill>
+                    <a:srgbClr val="595959"/>
+                  </a:solidFill>
+                  <a:latin typeface="+mj-lt"/>
+                </a:rPr>
+                <a:t>Exchange Server</a:t>
+              </a:r>
+            </a:p>
+            <a:p>
+              <a:pPr marL="285750" indent="-285750">
+                <a:buFont typeface="Arial" panose="020B0604020202020204" pitchFamily="34" charset="0"/>
+                <a:buChar char="•"/>
+              </a:pPr>
+              <a:r>
+                <a:rPr lang="en-US" sz="1200" dirty="0" smtClean="0">
+                  <a:solidFill>
+                    <a:srgbClr val="595959"/>
+                  </a:solidFill>
+                  <a:latin typeface="+mj-lt"/>
+                </a:rPr>
+                <a:t>Hosts mailboxes for users</a:t>
+              </a:r>
+            </a:p>
+            <a:p>
+              <a:pPr marL="285750" indent="-285750">
+                <a:buFont typeface="Arial" panose="020B0604020202020204" pitchFamily="34" charset="0"/>
+                <a:buChar char="•"/>
+              </a:pPr>
+              <a:r>
+                <a:rPr lang="en-US" sz="1200" dirty="0" smtClean="0">
+                  <a:solidFill>
+                    <a:srgbClr val="595959"/>
+                  </a:solidFill>
+                  <a:latin typeface="+mj-lt"/>
+                </a:rPr>
+                <a:t>Host Mail App Manifests</a:t>
+              </a:r>
+              <a:endParaRPr lang="en-US" sz="1200" dirty="0">
                 <a:solidFill>
-                  <a:schemeClr val="tx1"/>
+                  <a:srgbClr val="595959"/>
                 </a:solidFill>
-                <a:miter lim="800000"/>
-                <a:headEnd/>
-                <a:tailEnd/>
-              </a14:hiddenLine>
-            </a:ext>
-            <a:ext uri="{AF507438-7753-43E0-B8FC-AC1667EBCBE1}">
-              <a14:hiddenEffects xmlns:a14="http://schemas.microsoft.com/office/drawing/2010/main">
-                <a:effectLst>
-                  <a:outerShdw dist="35921" dir="2700000" algn="ctr" rotWithShape="0">
-                    <a:schemeClr val="bg2"/>
-                  </a:outerShdw>
-                </a:effectLst>
-              </a14:hiddenEffects>
-            </a:ext>
-          </a:extLst>
-        </p:spPr>
-      </p:pic>
-      <p:sp>
-        <p:nvSpPr>
-          <p:cNvPr id="3" name="Freeform 2"/>
-          <p:cNvSpPr/>
-          <p:nvPr/>
-        </p:nvSpPr>
-        <p:spPr bwMode="auto">
-          <a:xfrm>
-            <a:off x="11240466" y="2402248"/>
-            <a:ext cx="646007" cy="1842449"/>
-          </a:xfrm>
-          <a:custGeom>
-            <a:avLst/>
-            <a:gdLst>
-              <a:gd name="connsiteX0" fmla="*/ 232012 w 646007"/>
-              <a:gd name="connsiteY0" fmla="*/ 2183642 h 2183642"/>
-              <a:gd name="connsiteX1" fmla="*/ 532263 w 646007"/>
-              <a:gd name="connsiteY1" fmla="*/ 1678675 h 2183642"/>
-              <a:gd name="connsiteX2" fmla="*/ 641445 w 646007"/>
-              <a:gd name="connsiteY2" fmla="*/ 968991 h 2183642"/>
-              <a:gd name="connsiteX3" fmla="*/ 559558 w 646007"/>
-              <a:gd name="connsiteY3" fmla="*/ 272955 h 2183642"/>
-              <a:gd name="connsiteX4" fmla="*/ 0 w 646007"/>
-              <a:gd name="connsiteY4" fmla="*/ 0 h 2183642"/>
-            </a:gdLst>
-            <a:ahLst/>
-            <a:cxnLst>
-              <a:cxn ang="0">
-                <a:pos x="connsiteX0" y="connsiteY0"/>
-              </a:cxn>
-              <a:cxn ang="0">
-                <a:pos x="connsiteX1" y="connsiteY1"/>
-              </a:cxn>
-              <a:cxn ang="0">
-                <a:pos x="connsiteX2" y="connsiteY2"/>
-              </a:cxn>
-              <a:cxn ang="0">
-                <a:pos x="connsiteX3" y="connsiteY3"/>
-              </a:cxn>
-              <a:cxn ang="0">
-                <a:pos x="connsiteX4" y="connsiteY4"/>
-              </a:cxn>
-            </a:cxnLst>
-            <a:rect l="l" t="t" r="r" b="b"/>
-            <a:pathLst>
-              <a:path w="646007" h="2183642">
-                <a:moveTo>
-                  <a:pt x="232012" y="2183642"/>
-                </a:moveTo>
-                <a:cubicBezTo>
-                  <a:pt x="348018" y="2032379"/>
-                  <a:pt x="464024" y="1881117"/>
-                  <a:pt x="532263" y="1678675"/>
-                </a:cubicBezTo>
-                <a:cubicBezTo>
-                  <a:pt x="600502" y="1476233"/>
-                  <a:pt x="636896" y="1203278"/>
-                  <a:pt x="641445" y="968991"/>
-                </a:cubicBezTo>
-                <a:cubicBezTo>
-                  <a:pt x="645994" y="734704"/>
-                  <a:pt x="666465" y="434453"/>
-                  <a:pt x="559558" y="272955"/>
-                </a:cubicBezTo>
-                <a:cubicBezTo>
-                  <a:pt x="452651" y="111457"/>
-                  <a:pt x="226325" y="55728"/>
-                  <a:pt x="0" y="0"/>
-                </a:cubicBezTo>
-              </a:path>
-            </a:pathLst>
-          </a:custGeom>
-          <a:noFill/>
-          <a:ln w="38100">
+                <a:latin typeface="+mj-lt"/>
+              </a:endParaRPr>
+            </a:p>
+          </p:txBody>
+        </p:sp>
+        <p:sp>
+          <p:nvSpPr>
+            <p:cNvPr id="12" name="Arc 11"/>
+            <p:cNvSpPr/>
+            <p:nvPr/>
+          </p:nvSpPr>
+          <p:spPr>
+            <a:xfrm>
+              <a:off x="4623667" y="2881084"/>
+              <a:ext cx="1286884" cy="1743031"/>
+            </a:xfrm>
+            <a:prstGeom prst="arc">
+              <a:avLst>
+                <a:gd name="adj1" fmla="val 16694018"/>
+                <a:gd name="adj2" fmla="val 4372380"/>
+              </a:avLst>
+            </a:prstGeom>
+            <a:ln w="47625">
+              <a:solidFill>
+                <a:schemeClr val="tx1">
+                  <a:alpha val="60000"/>
+                </a:schemeClr>
+              </a:solidFill>
+              <a:headEnd type="stealth" w="lg" len="lg"/>
+              <a:tailEnd type="oval" w="med" len="med"/>
+            </a:ln>
+          </p:spPr>
+          <p:style>
+            <a:lnRef idx="1">
+              <a:schemeClr val="accent1"/>
+            </a:lnRef>
+            <a:fillRef idx="0">
+              <a:schemeClr val="accent1"/>
+            </a:fillRef>
+            <a:effectRef idx="0">
+              <a:schemeClr val="accent1"/>
+            </a:effectRef>
+            <a:fontRef idx="minor">
+              <a:schemeClr val="tx1"/>
+            </a:fontRef>
+          </p:style>
+          <p:txBody>
+            <a:bodyPr rtlCol="0" anchor="ctr"/>
+            <a:lstStyle/>
+            <a:p>
+              <a:pPr algn="ctr"/>
+              <a:endParaRPr lang="en-US"/>
+            </a:p>
+          </p:txBody>
+        </p:sp>
+        <p:cxnSp>
+          <p:nvCxnSpPr>
+            <p:cNvPr id="13" name="Straight Arrow Connector 12"/>
+            <p:cNvCxnSpPr/>
+            <p:nvPr/>
+          </p:nvCxnSpPr>
+          <p:spPr>
+            <a:xfrm flipV="1">
+              <a:off x="2359890" y="3710307"/>
+              <a:ext cx="826806" cy="614595"/>
+            </a:xfrm>
+            <a:prstGeom prst="straightConnector1">
+              <a:avLst/>
+            </a:prstGeom>
+            <a:ln w="44450">
+              <a:solidFill>
+                <a:schemeClr val="tx1">
+                  <a:alpha val="60000"/>
+                </a:schemeClr>
+              </a:solidFill>
+              <a:headEnd type="none"/>
+              <a:tailEnd type="stealth" w="lg" len="lg"/>
+            </a:ln>
+          </p:spPr>
+          <p:style>
+            <a:lnRef idx="1">
+              <a:schemeClr val="accent1"/>
+            </a:lnRef>
+            <a:fillRef idx="0">
+              <a:schemeClr val="accent1"/>
+            </a:fillRef>
+            <a:effectRef idx="0">
+              <a:schemeClr val="accent1"/>
+            </a:effectRef>
+            <a:fontRef idx="minor">
+              <a:schemeClr val="tx1"/>
+            </a:fontRef>
+          </p:style>
+        </p:cxnSp>
+        <p:cxnSp>
+          <p:nvCxnSpPr>
+            <p:cNvPr id="14" name="Straight Arrow Connector 13"/>
+            <p:cNvCxnSpPr/>
+            <p:nvPr/>
+          </p:nvCxnSpPr>
+          <p:spPr>
+            <a:xfrm>
+              <a:off x="2386401" y="4324902"/>
+              <a:ext cx="719183" cy="1026190"/>
+            </a:xfrm>
+            <a:prstGeom prst="straightConnector1">
+              <a:avLst/>
+            </a:prstGeom>
+            <a:ln w="44450">
+              <a:solidFill>
+                <a:schemeClr val="tx1">
+                  <a:alpha val="60000"/>
+                </a:schemeClr>
+              </a:solidFill>
+              <a:headEnd type="none"/>
+              <a:tailEnd type="stealth" w="lg" len="lg"/>
+            </a:ln>
+          </p:spPr>
+          <p:style>
+            <a:lnRef idx="1">
+              <a:schemeClr val="accent1"/>
+            </a:lnRef>
+            <a:fillRef idx="0">
+              <a:schemeClr val="accent1"/>
+            </a:fillRef>
+            <a:effectRef idx="0">
+              <a:schemeClr val="accent1"/>
+            </a:effectRef>
+            <a:fontRef idx="minor">
+              <a:schemeClr val="tx1"/>
+            </a:fontRef>
+          </p:style>
+        </p:cxnSp>
+        <p:sp>
+          <p:nvSpPr>
+            <p:cNvPr id="15" name="TextBox 14"/>
+            <p:cNvSpPr txBox="1"/>
+            <p:nvPr/>
+          </p:nvSpPr>
+          <p:spPr>
+            <a:xfrm>
+              <a:off x="5488191" y="3525641"/>
+              <a:ext cx="627662" cy="442035"/>
+            </a:xfrm>
+            <a:prstGeom prst="rect">
+              <a:avLst/>
+            </a:prstGeom>
             <a:solidFill>
-              <a:srgbClr val="C00000"/>
+              <a:schemeClr val="bg1">
+                <a:alpha val="85000"/>
+              </a:schemeClr>
             </a:solidFill>
-            <a:headEnd type="oval" w="med" len="med"/>
-            <a:tailEnd type="triangle" w="med" len="med"/>
-          </a:ln>
-          <a:effectLst/>
-        </p:spPr>
-        <p:style>
-          <a:lnRef idx="1">
-            <a:schemeClr val="accent2"/>
-          </a:lnRef>
-          <a:fillRef idx="3">
-            <a:schemeClr val="accent2"/>
-          </a:fillRef>
-          <a:effectRef idx="2">
-            <a:schemeClr val="accent2"/>
-          </a:effectRef>
-          <a:fontRef idx="minor">
-            <a:schemeClr val="lt1"/>
-          </a:fontRef>
-        </p:style>
-        <p:txBody>
-          <a:bodyPr rtlCol="0" anchor="ctr"/>
-          <a:lstStyle/>
-          <a:p>
-            <a:pPr algn="ctr"/>
-            <a:endParaRPr lang="en-US"/>
-          </a:p>
-        </p:txBody>
-      </p:sp>
-      <p:sp>
-        <p:nvSpPr>
-          <p:cNvPr id="5" name="Rounded Rectangle 4"/>
-          <p:cNvSpPr/>
-          <p:nvPr/>
-        </p:nvSpPr>
-        <p:spPr bwMode="auto">
-          <a:xfrm>
-            <a:off x="11536116" y="2892675"/>
-            <a:ext cx="541313" cy="383027"/>
-          </a:xfrm>
-          <a:prstGeom prst="roundRect">
-            <a:avLst/>
-          </a:prstGeom>
-          <a:solidFill>
-            <a:schemeClr val="accent4">
-              <a:lumMod val="20000"/>
-              <a:lumOff val="80000"/>
-            </a:schemeClr>
-          </a:solidFill>
-          <a:ln>
-            <a:solidFill>
-              <a:srgbClr val="C00000"/>
-            </a:solidFill>
-            <a:headEnd type="none" w="med" len="med"/>
-            <a:tailEnd type="none" w="med" len="med"/>
-          </a:ln>
-          <a:effectLst/>
-        </p:spPr>
-        <p:style>
-          <a:lnRef idx="1">
-            <a:schemeClr val="accent2"/>
-          </a:lnRef>
-          <a:fillRef idx="3">
-            <a:schemeClr val="accent2"/>
-          </a:fillRef>
-          <a:effectRef idx="2">
-            <a:schemeClr val="accent2"/>
-          </a:effectRef>
-          <a:fontRef idx="minor">
-            <a:schemeClr val="lt1"/>
-          </a:fontRef>
-        </p:style>
-        <p:txBody>
-          <a:bodyPr vert="horz" wrap="square" lIns="0" tIns="0" rIns="0" bIns="0" numCol="1" rtlCol="0" anchor="ctr" anchorCtr="0" compatLnSpc="1">
-            <a:prstTxWarp prst="textNoShape">
+            <a:ln>
+              <a:solidFill>
+                <a:schemeClr val="accent5"/>
+              </a:solidFill>
+            </a:ln>
+          </p:spPr>
+          <p:txBody>
+            <a:bodyPr wrap="none" lIns="36000" tIns="36000" rIns="36000" bIns="36000" rtlCol="0">
+              <a:spAutoFit/>
+            </a:bodyPr>
+            <a:lstStyle/>
+            <a:p>
+              <a:pPr algn="ctr"/>
+              <a:r>
+                <a:rPr lang="en-US" sz="2400" spc="-70" dirty="0" smtClean="0">
+                  <a:gradFill>
+                    <a:gsLst>
+                      <a:gs pos="2917">
+                        <a:schemeClr val="bg2"/>
+                      </a:gs>
+                      <a:gs pos="95000">
+                        <a:schemeClr val="bg2"/>
+                      </a:gs>
+                    </a:gsLst>
+                    <a:lin ang="5400000" scaled="0"/>
+                  </a:gradFill>
+                  <a:latin typeface="+mj-lt"/>
+                </a:rPr>
+                <a:t>EWS</a:t>
+              </a:r>
+            </a:p>
+          </p:txBody>
+        </p:sp>
+        <p:pic>
+          <p:nvPicPr>
+            <p:cNvPr id="16" name="Picture 15"/>
+            <p:cNvPicPr>
+              <a:picLocks noChangeAspect="1"/>
+            </p:cNvPicPr>
+            <p:nvPr/>
+          </p:nvPicPr>
+          <p:blipFill>
+            <a:blip r:embed="rId3"/>
+            <a:stretch>
+              <a:fillRect/>
+            </a:stretch>
+          </p:blipFill>
+          <p:spPr>
+            <a:xfrm>
+              <a:off x="3143518" y="5213647"/>
+              <a:ext cx="1091447" cy="1222014"/>
+            </a:xfrm>
+            <a:prstGeom prst="rect">
               <a:avLst/>
-            </a:prstTxWarp>
-          </a:bodyPr>
-          <a:lstStyle/>
-          <a:p>
-            <a:pPr algn="ctr" defTabSz="914099" fontAlgn="base">
-              <a:spcBef>
-                <a:spcPct val="0"/>
-              </a:spcBef>
-              <a:spcAft>
-                <a:spcPct val="0"/>
-              </a:spcAft>
-            </a:pPr>
-            <a:r>
-              <a:rPr lang="en-US" sz="1200" dirty="0" smtClean="0">
-                <a:solidFill>
-                  <a:srgbClr val="C00000"/>
-                </a:solidFill>
-                <a:latin typeface="Arial Black" pitchFamily="34" charset="0"/>
-              </a:rPr>
-              <a:t>EWS</a:t>
-            </a:r>
-          </a:p>
-        </p:txBody>
-      </p:sp>
+            </a:prstGeom>
+          </p:spPr>
+        </p:pic>
+        <p:pic>
+          <p:nvPicPr>
+            <p:cNvPr id="17" name="Picture 16"/>
+            <p:cNvPicPr>
+              <a:picLocks noChangeAspect="1"/>
+            </p:cNvPicPr>
+            <p:nvPr/>
+          </p:nvPicPr>
+          <p:blipFill>
+            <a:blip r:embed="rId4"/>
+            <a:stretch>
+              <a:fillRect/>
+            </a:stretch>
+          </p:blipFill>
+          <p:spPr>
+            <a:xfrm>
+              <a:off x="3105584" y="2532554"/>
+              <a:ext cx="996696" cy="1138301"/>
+            </a:xfrm>
+            <a:prstGeom prst="rect">
+              <a:avLst/>
+            </a:prstGeom>
+          </p:spPr>
+        </p:pic>
+        <p:grpSp>
+          <p:nvGrpSpPr>
+            <p:cNvPr id="18" name="Group 17"/>
+            <p:cNvGrpSpPr>
+              <a:grpSpLocks noChangeAspect="1"/>
+            </p:cNvGrpSpPr>
+            <p:nvPr/>
+          </p:nvGrpSpPr>
+          <p:grpSpPr>
+            <a:xfrm>
+              <a:off x="556810" y="3556051"/>
+              <a:ext cx="1908000" cy="1210662"/>
+              <a:chOff x="1139868" y="4066586"/>
+              <a:chExt cx="2595986" cy="1647208"/>
+            </a:xfrm>
+          </p:grpSpPr>
+          <p:pic>
+            <p:nvPicPr>
+              <p:cNvPr id="19" name="Picture 18"/>
+              <p:cNvPicPr>
+                <a:picLocks noChangeAspect="1"/>
+              </p:cNvPicPr>
+              <p:nvPr/>
+            </p:nvPicPr>
+            <p:blipFill>
+              <a:blip r:embed="rId5"/>
+              <a:stretch>
+                <a:fillRect/>
+              </a:stretch>
+            </p:blipFill>
+            <p:spPr>
+              <a:xfrm>
+                <a:off x="1139868" y="4066586"/>
+                <a:ext cx="1334950" cy="1267414"/>
+              </a:xfrm>
+              <a:prstGeom prst="rect">
+                <a:avLst/>
+              </a:prstGeom>
+            </p:spPr>
+          </p:pic>
+          <p:pic>
+            <p:nvPicPr>
+              <p:cNvPr id="20" name="Picture 19"/>
+              <p:cNvPicPr>
+                <a:picLocks noChangeAspect="1"/>
+              </p:cNvPicPr>
+              <p:nvPr/>
+            </p:nvPicPr>
+            <p:blipFill>
+              <a:blip r:embed="rId6"/>
+              <a:stretch>
+                <a:fillRect/>
+              </a:stretch>
+            </p:blipFill>
+            <p:spPr>
+              <a:xfrm>
+                <a:off x="3094920" y="4756795"/>
+                <a:ext cx="640934" cy="956999"/>
+              </a:xfrm>
+              <a:prstGeom prst="rect">
+                <a:avLst/>
+              </a:prstGeom>
+            </p:spPr>
+          </p:pic>
+          <p:pic>
+            <p:nvPicPr>
+              <p:cNvPr id="21" name="Picture 20"/>
+              <p:cNvPicPr>
+                <a:picLocks noChangeAspect="1"/>
+              </p:cNvPicPr>
+              <p:nvPr/>
+            </p:nvPicPr>
+            <p:blipFill>
+              <a:blip r:embed="rId7"/>
+              <a:stretch>
+                <a:fillRect/>
+              </a:stretch>
+            </p:blipFill>
+            <p:spPr>
+              <a:xfrm>
+                <a:off x="1997499" y="4928434"/>
+                <a:ext cx="963439" cy="699247"/>
+              </a:xfrm>
+              <a:prstGeom prst="rect">
+                <a:avLst/>
+              </a:prstGeom>
+            </p:spPr>
+          </p:pic>
+          <p:pic>
+            <p:nvPicPr>
+              <p:cNvPr id="22" name="Picture 21"/>
+              <p:cNvPicPr>
+                <a:picLocks noChangeAspect="1"/>
+              </p:cNvPicPr>
+              <p:nvPr/>
+            </p:nvPicPr>
+            <p:blipFill>
+              <a:blip r:embed="rId8"/>
+              <a:stretch>
+                <a:fillRect/>
+              </a:stretch>
+            </p:blipFill>
+            <p:spPr>
+              <a:xfrm>
+                <a:off x="2459086" y="4506645"/>
+                <a:ext cx="907928" cy="658958"/>
+              </a:xfrm>
+              <a:prstGeom prst="rect">
+                <a:avLst/>
+              </a:prstGeom>
+            </p:spPr>
+          </p:pic>
+        </p:grpSp>
+      </p:grpSp>
     </p:spTree>
     <p:extLst>
       <p:ext uri="{BB962C8B-B14F-4D97-AF65-F5344CB8AC3E}">
@@ -21593,124 +21573,9 @@
   <p:timing>
     <p:tnLst>
       <p:par>
-        <p:cTn id="1" dur="indefinite" restart="never" nodeType="tmRoot">
-          <p:childTnLst>
-            <p:seq concurrent="1" nextAc="seek">
-              <p:cTn id="2" dur="indefinite" nodeType="mainSeq">
-                <p:childTnLst>
-                  <p:par>
-                    <p:cTn id="3" fill="hold">
-                      <p:stCondLst>
-                        <p:cond delay="indefinite"/>
-                      </p:stCondLst>
-                      <p:childTnLst>
-                        <p:par>
-                          <p:cTn id="4" fill="hold">
-                            <p:stCondLst>
-                              <p:cond delay="0"/>
-                            </p:stCondLst>
-                            <p:childTnLst>
-                              <p:par>
-                                <p:cTn id="5" presetID="10" presetClass="entr" presetSubtype="0" fill="hold" grpId="0" nodeType="clickEffect">
-                                  <p:stCondLst>
-                                    <p:cond delay="0"/>
-                                  </p:stCondLst>
-                                  <p:childTnLst>
-                                    <p:set>
-                                      <p:cBhvr>
-                                        <p:cTn id="6" dur="1" fill="hold">
-                                          <p:stCondLst>
-                                            <p:cond delay="0"/>
-                                          </p:stCondLst>
-                                        </p:cTn>
-                                        <p:tgtEl>
-                                          <p:spTgt spid="3"/>
-                                        </p:tgtEl>
-                                        <p:attrNameLst>
-                                          <p:attrName>style.visibility</p:attrName>
-                                        </p:attrNameLst>
-                                      </p:cBhvr>
-                                      <p:to>
-                                        <p:strVal val="visible"/>
-                                      </p:to>
-                                    </p:set>
-                                    <p:animEffect transition="in" filter="fade">
-                                      <p:cBhvr>
-                                        <p:cTn id="7" dur="500"/>
-                                        <p:tgtEl>
-                                          <p:spTgt spid="3"/>
-                                        </p:tgtEl>
-                                      </p:cBhvr>
-                                    </p:animEffect>
-                                  </p:childTnLst>
-                                </p:cTn>
-                              </p:par>
-                              <p:par>
-                                <p:cTn id="8" presetID="10" presetClass="entr" presetSubtype="0" fill="hold" grpId="0" nodeType="withEffect">
-                                  <p:stCondLst>
-                                    <p:cond delay="0"/>
-                                  </p:stCondLst>
-                                  <p:childTnLst>
-                                    <p:set>
-                                      <p:cBhvr>
-                                        <p:cTn id="9" dur="1" fill="hold">
-                                          <p:stCondLst>
-                                            <p:cond delay="0"/>
-                                          </p:stCondLst>
-                                        </p:cTn>
-                                        <p:tgtEl>
-                                          <p:spTgt spid="5"/>
-                                        </p:tgtEl>
-                                        <p:attrNameLst>
-                                          <p:attrName>style.visibility</p:attrName>
-                                        </p:attrNameLst>
-                                      </p:cBhvr>
-                                      <p:to>
-                                        <p:strVal val="visible"/>
-                                      </p:to>
-                                    </p:set>
-                                    <p:animEffect transition="in" filter="fade">
-                                      <p:cBhvr>
-                                        <p:cTn id="10" dur="500"/>
-                                        <p:tgtEl>
-                                          <p:spTgt spid="5"/>
-                                        </p:tgtEl>
-                                      </p:cBhvr>
-                                    </p:animEffect>
-                                  </p:childTnLst>
-                                </p:cTn>
-                              </p:par>
-                            </p:childTnLst>
-                          </p:cTn>
-                        </p:par>
-                      </p:childTnLst>
-                    </p:cTn>
-                  </p:par>
-                </p:childTnLst>
-              </p:cTn>
-              <p:prevCondLst>
-                <p:cond evt="onPrev" delay="0">
-                  <p:tgtEl>
-                    <p:sldTgt/>
-                  </p:tgtEl>
-                </p:cond>
-              </p:prevCondLst>
-              <p:nextCondLst>
-                <p:cond evt="onNext" delay="0">
-                  <p:tgtEl>
-                    <p:sldTgt/>
-                  </p:tgtEl>
-                </p:cond>
-              </p:nextCondLst>
-            </p:seq>
-          </p:childTnLst>
-        </p:cTn>
+        <p:cTn id="1" dur="indefinite" restart="never" nodeType="tmRoot"/>
       </p:par>
     </p:tnLst>
-    <p:bldLst>
-      <p:bldP spid="3" grpId="0" animBg="1"/>
-      <p:bldP spid="5" grpId="0" animBg="1"/>
-    </p:bldLst>
   </p:timing>
 </p:sld>
 </file>
@@ -24067,7 +23932,7 @@
                 <a:gridCol w="11225057">
                   <a:extLst>
                     <a:ext uri="{9D8B030D-6E8A-4147-A177-3AD203B41FA5}">
-                      <a16:colId xmlns="" xmlns:a16="http://schemas.microsoft.com/office/drawing/2014/main" val="1253488153"/>
+                      <a16:colId xmlns:a16="http://schemas.microsoft.com/office/drawing/2014/main" xmlns="" val="1253488153"/>
                     </a:ext>
                   </a:extLst>
                 </a:gridCol>
@@ -24097,7 +23962,7 @@
                 </a:tc>
                 <a:extLst>
                   <a:ext uri="{0D108BD9-81ED-4DB2-BD59-A6C34878D82A}">
-                    <a16:rowId xmlns="" xmlns:a16="http://schemas.microsoft.com/office/drawing/2014/main" val="829859176"/>
+                    <a16:rowId xmlns:a16="http://schemas.microsoft.com/office/drawing/2014/main" xmlns="" val="829859176"/>
                   </a:ext>
                 </a:extLst>
               </a:tr>
@@ -24118,7 +23983,7 @@
                 </a:tc>
                 <a:extLst>
                   <a:ext uri="{0D108BD9-81ED-4DB2-BD59-A6C34878D82A}">
-                    <a16:rowId xmlns="" xmlns:a16="http://schemas.microsoft.com/office/drawing/2014/main" val="1946132611"/>
+                    <a16:rowId xmlns:a16="http://schemas.microsoft.com/office/drawing/2014/main" xmlns="" val="1946132611"/>
                   </a:ext>
                 </a:extLst>
               </a:tr>
@@ -24155,7 +24020,7 @@
                 </a:tc>
                 <a:extLst>
                   <a:ext uri="{0D108BD9-81ED-4DB2-BD59-A6C34878D82A}">
-                    <a16:rowId xmlns="" xmlns:a16="http://schemas.microsoft.com/office/drawing/2014/main" val="3204002662"/>
+                    <a16:rowId xmlns:a16="http://schemas.microsoft.com/office/drawing/2014/main" xmlns="" val="3204002662"/>
                   </a:ext>
                 </a:extLst>
               </a:tr>
@@ -24196,7 +24061,7 @@
                 </a:tc>
                 <a:extLst>
                   <a:ext uri="{0D108BD9-81ED-4DB2-BD59-A6C34878D82A}">
-                    <a16:rowId xmlns="" xmlns:a16="http://schemas.microsoft.com/office/drawing/2014/main" val="4266278162"/>
+                    <a16:rowId xmlns:a16="http://schemas.microsoft.com/office/drawing/2014/main" xmlns="" val="4266278162"/>
                   </a:ext>
                 </a:extLst>
               </a:tr>
@@ -26954,14 +26819,14 @@
           <a:effectLst/>
           <a:extLst>
             <a:ext uri="{909E8E84-426E-40dd-AFC4-6F175D3DCCD1}">
-              <a14:hiddenFill xmlns:a14="http://schemas.microsoft.com/office/drawing/2010/main" xmlns="">
+              <a14:hiddenFill xmlns="" xmlns:a14="http://schemas.microsoft.com/office/drawing/2010/main">
                 <a:solidFill>
                   <a:schemeClr val="accent1"/>
                 </a:solidFill>
               </a14:hiddenFill>
             </a:ext>
             <a:ext uri="{91240B29-F687-4f45-9708-019B960494DF}">
-              <a14:hiddenLine xmlns:a14="http://schemas.microsoft.com/office/drawing/2010/main" xmlns="" w="9525">
+              <a14:hiddenLine xmlns="" xmlns:a14="http://schemas.microsoft.com/office/drawing/2010/main" w="9525">
                 <a:solidFill>
                   <a:schemeClr val="tx1"/>
                 </a:solidFill>
@@ -26971,7 +26836,7 @@
               </a14:hiddenLine>
             </a:ext>
             <a:ext uri="{AF507438-7753-43e0-B8FC-AC1667EBCBE1}">
-              <a14:hiddenEffects xmlns:a14="http://schemas.microsoft.com/office/drawing/2010/main" xmlns="">
+              <a14:hiddenEffects xmlns="" xmlns:a14="http://schemas.microsoft.com/office/drawing/2010/main">
                 <a:effectLst>
                   <a:outerShdw dist="35921" dir="2700000" algn="ctr" rotWithShape="0">
                     <a:schemeClr val="bg2"/>
@@ -28706,15 +28571,7 @@
                   <a:srgbClr val="FFFFFF"/>
                 </a:solidFill>
               </a:rPr>
-              <a:t> </a:t>
-            </a:r>
-            <a:r>
-              <a:rPr lang="en-US" sz="2352" dirty="0">
-                <a:solidFill>
-                  <a:srgbClr val="FFFFFF"/>
-                </a:solidFill>
-              </a:rPr>
-              <a:t>item</a:t>
+              <a:t> item</a:t>
             </a:r>
           </a:p>
           <a:p>
@@ -28880,15 +28737,7 @@
           <a:p>
             <a:r>
               <a:rPr lang="en-US" dirty="0" smtClean="0"/>
-              <a:t>Four </a:t>
-            </a:r>
-            <a:r>
-              <a:rPr lang="en-US" dirty="0" smtClean="0"/>
-              <a:t>Stakeholders of </a:t>
-            </a:r>
-            <a:r>
-              <a:rPr lang="en-US" dirty="0" smtClean="0"/>
-              <a:t>Security</a:t>
+              <a:t>Four Stakeholders of Security</a:t>
             </a:r>
             <a:endParaRPr lang="en-US" dirty="0"/>
           </a:p>
@@ -29207,11 +29056,7 @@
             </a:pPr>
             <a:r>
               <a:rPr lang="en-US" sz="1764" dirty="0"/>
-              <a:t>App </a:t>
-            </a:r>
-            <a:r>
-              <a:rPr lang="en-US" sz="1764" dirty="0"/>
-              <a:t>can access data from all entities</a:t>
+              <a:t>App can access data from all entities</a:t>
             </a:r>
           </a:p>
           <a:p>
@@ -29246,7 +29091,6 @@
               <a:rPr lang="en-US" sz="1764" dirty="0"/>
               <a:t>EWS calls are not allowed</a:t>
             </a:r>
-            <a:endParaRPr lang="en-US" sz="1764" dirty="0"/>
           </a:p>
           <a:p>
             <a:pPr lvl="1"/>
@@ -29283,7 +29127,6 @@
               <a:rPr lang="en-US" sz="1764" dirty="0"/>
               <a:t>Limited EWS methods are allowed</a:t>
             </a:r>
-            <a:endParaRPr lang="en-US" sz="1764" dirty="0"/>
           </a:p>
         </p:txBody>
       </p:sp>
@@ -30250,11 +30093,11 @@
   <p:clrMapOvr>
     <a:masterClrMapping/>
   </p:clrMapOvr>
-  <mc:AlternateContent xmlns:mc="http://schemas.openxmlformats.org/markup-compatibility/2006">
-    <mc:Choice xmlns:p14="http://schemas.microsoft.com/office/powerpoint/2010/main" Requires="p14">
+  <mc:AlternateContent xmlns:mc="http://schemas.openxmlformats.org/markup-compatibility/2006" xmlns:p14="http://schemas.microsoft.com/office/powerpoint/2010/main">
+    <mc:Choice Requires="p14">
       <p:transition p14:dur="0"/>
     </mc:Choice>
-    <mc:Fallback>
+    <mc:Fallback xmlns="">
       <p:transition/>
     </mc:Fallback>
   </mc:AlternateContent>
@@ -30332,11 +30175,7 @@
             <a:pPr lvl="1"/>
             <a:r>
               <a:rPr lang="en-US" dirty="0" smtClean="0"/>
-              <a:t>Task Pane </a:t>
-            </a:r>
-            <a:r>
-              <a:rPr lang="en-US" dirty="0" smtClean="0"/>
-              <a:t>App</a:t>
+              <a:t>Task Pane App</a:t>
             </a:r>
             <a:endParaRPr lang="en-US" i="1" dirty="0" smtClean="0">
               <a:solidFill>
@@ -30357,11 +30196,7 @@
             <a:pPr lvl="1"/>
             <a:r>
               <a:rPr lang="en-US" dirty="0" smtClean="0"/>
-              <a:t>Mail </a:t>
-            </a:r>
-            <a:r>
-              <a:rPr lang="en-US" dirty="0" smtClean="0"/>
-              <a:t>App </a:t>
+              <a:t>Mail App </a:t>
             </a:r>
             <a:r>
               <a:rPr lang="en-US" i="1" dirty="0">
@@ -30515,27 +30350,2163 @@
       </p:sp>
       <p:grpSp>
         <p:nvGrpSpPr>
-          <p:cNvPr id="4" name="Group 3"/>
+          <p:cNvPr id="10" name="Group 9"/>
           <p:cNvGrpSpPr/>
           <p:nvPr/>
         </p:nvGrpSpPr>
         <p:grpSpPr>
           <a:xfrm>
-            <a:off x="1074686" y="3535108"/>
-            <a:ext cx="9831548" cy="2548920"/>
-            <a:chOff x="659720" y="3937907"/>
-            <a:chExt cx="8670472" cy="2247900"/>
+            <a:off x="1011490" y="3491435"/>
+            <a:ext cx="9594435" cy="2442792"/>
+            <a:chOff x="1163890" y="3052077"/>
+            <a:chExt cx="9594435" cy="2442792"/>
           </a:xfrm>
         </p:grpSpPr>
+        <p:grpSp>
+          <p:nvGrpSpPr>
+            <p:cNvPr id="11" name="Group 10"/>
+            <p:cNvGrpSpPr/>
+            <p:nvPr/>
+          </p:nvGrpSpPr>
+          <p:grpSpPr>
+            <a:xfrm>
+              <a:off x="4502991" y="3113564"/>
+              <a:ext cx="2897920" cy="2381305"/>
+              <a:chOff x="8415338" y="3969071"/>
+              <a:chExt cx="3516163" cy="2594233"/>
+            </a:xfrm>
+          </p:grpSpPr>
+          <p:sp>
+            <p:nvSpPr>
+              <p:cNvPr id="61" name="Rectangle 60"/>
+              <p:cNvSpPr/>
+              <p:nvPr/>
+            </p:nvSpPr>
+            <p:spPr>
+              <a:xfrm>
+                <a:off x="8428642" y="3969071"/>
+                <a:ext cx="3502859" cy="2594233"/>
+              </a:xfrm>
+              <a:prstGeom prst="rect">
+                <a:avLst/>
+              </a:prstGeom>
+              <a:solidFill>
+                <a:srgbClr val="FFFFFF"/>
+              </a:solidFill>
+              <a:ln w="28575" cap="flat" cmpd="sng" algn="ctr">
+                <a:solidFill>
+                  <a:srgbClr val="262626">
+                    <a:lumMod val="40000"/>
+                    <a:lumOff val="60000"/>
+                  </a:srgbClr>
+                </a:solidFill>
+                <a:prstDash val="solid"/>
+              </a:ln>
+              <a:effectLst>
+                <a:outerShdw blurRad="50800" dist="38100" dir="2700000" algn="tl" rotWithShape="0">
+                  <a:prstClr val="black">
+                    <a:alpha val="40000"/>
+                  </a:prstClr>
+                </a:outerShdw>
+              </a:effectLst>
+            </p:spPr>
+            <p:txBody>
+              <a:bodyPr rtlCol="0" anchor="ctr"/>
+              <a:lstStyle/>
+              <a:p>
+                <a:pPr algn="ctr" defTabSz="761183"/>
+                <a:endParaRPr lang="en-US" sz="1500" kern="0">
+                  <a:solidFill>
+                    <a:srgbClr val="1B1B1B"/>
+                  </a:solidFill>
+                  <a:latin typeface="Segoe UI"/>
+                </a:endParaRPr>
+              </a:p>
+            </p:txBody>
+          </p:sp>
+          <p:sp>
+            <p:nvSpPr>
+              <p:cNvPr id="62" name="Rectangle 61"/>
+              <p:cNvSpPr/>
+              <p:nvPr/>
+            </p:nvSpPr>
+            <p:spPr>
+              <a:xfrm>
+                <a:off x="8415338" y="3969071"/>
+                <a:ext cx="3516163" cy="529025"/>
+              </a:xfrm>
+              <a:prstGeom prst="rect">
+                <a:avLst/>
+              </a:prstGeom>
+              <a:solidFill>
+                <a:srgbClr val="FFFFFF"/>
+              </a:solidFill>
+              <a:ln w="28575" cap="flat" cmpd="sng" algn="ctr">
+                <a:solidFill>
+                  <a:srgbClr val="262626">
+                    <a:lumMod val="40000"/>
+                    <a:lumOff val="60000"/>
+                  </a:srgbClr>
+                </a:solidFill>
+                <a:prstDash val="solid"/>
+              </a:ln>
+              <a:effectLst/>
+            </p:spPr>
+            <p:txBody>
+              <a:bodyPr rtlCol="0" anchor="ctr"/>
+              <a:lstStyle/>
+              <a:p>
+                <a:pPr algn="ctr" defTabSz="761183"/>
+                <a:r>
+                  <a:rPr lang="en-US" sz="1400" b="1" kern="0" dirty="0" smtClean="0">
+                    <a:solidFill>
+                      <a:schemeClr val="tx1">
+                        <a:lumMod val="50000"/>
+                        <a:lumOff val="50000"/>
+                      </a:schemeClr>
+                    </a:solidFill>
+                  </a:rPr>
+                  <a:t>Excel Application</a:t>
+                </a:r>
+                <a:endParaRPr lang="en-US" sz="1400" b="1" kern="0" dirty="0">
+                  <a:solidFill>
+                    <a:schemeClr val="tx1">
+                      <a:lumMod val="50000"/>
+                      <a:lumOff val="50000"/>
+                    </a:schemeClr>
+                  </a:solidFill>
+                </a:endParaRPr>
+              </a:p>
+            </p:txBody>
+          </p:sp>
+        </p:grpSp>
+        <p:grpSp>
+          <p:nvGrpSpPr>
+            <p:cNvPr id="12" name="Group 11"/>
+            <p:cNvGrpSpPr/>
+            <p:nvPr/>
+          </p:nvGrpSpPr>
+          <p:grpSpPr>
+            <a:xfrm>
+              <a:off x="1163890" y="3113564"/>
+              <a:ext cx="2897920" cy="2381305"/>
+              <a:chOff x="8415338" y="3969071"/>
+              <a:chExt cx="3516163" cy="2594233"/>
+            </a:xfrm>
+          </p:grpSpPr>
+          <p:sp>
+            <p:nvSpPr>
+              <p:cNvPr id="59" name="Rectangle 58"/>
+              <p:cNvSpPr/>
+              <p:nvPr/>
+            </p:nvSpPr>
+            <p:spPr>
+              <a:xfrm>
+                <a:off x="8428642" y="3969071"/>
+                <a:ext cx="3502859" cy="2594233"/>
+              </a:xfrm>
+              <a:prstGeom prst="rect">
+                <a:avLst/>
+              </a:prstGeom>
+              <a:solidFill>
+                <a:srgbClr val="FFFFFF"/>
+              </a:solidFill>
+              <a:ln w="28575" cap="flat" cmpd="sng" algn="ctr">
+                <a:solidFill>
+                  <a:srgbClr val="262626">
+                    <a:lumMod val="40000"/>
+                    <a:lumOff val="60000"/>
+                  </a:srgbClr>
+                </a:solidFill>
+                <a:prstDash val="solid"/>
+              </a:ln>
+              <a:effectLst>
+                <a:outerShdw blurRad="50800" dist="38100" dir="2700000" algn="tl" rotWithShape="0">
+                  <a:prstClr val="black">
+                    <a:alpha val="40000"/>
+                  </a:prstClr>
+                </a:outerShdw>
+              </a:effectLst>
+            </p:spPr>
+            <p:txBody>
+              <a:bodyPr rtlCol="0" anchor="ctr"/>
+              <a:lstStyle/>
+              <a:p>
+                <a:pPr algn="ctr" defTabSz="761183"/>
+                <a:endParaRPr lang="en-US" sz="1500" kern="0">
+                  <a:solidFill>
+                    <a:srgbClr val="1B1B1B"/>
+                  </a:solidFill>
+                  <a:latin typeface="Segoe UI"/>
+                </a:endParaRPr>
+              </a:p>
+            </p:txBody>
+          </p:sp>
+          <p:sp>
+            <p:nvSpPr>
+              <p:cNvPr id="60" name="Rectangle 59"/>
+              <p:cNvSpPr/>
+              <p:nvPr/>
+            </p:nvSpPr>
+            <p:spPr>
+              <a:xfrm>
+                <a:off x="8415338" y="3969071"/>
+                <a:ext cx="3516163" cy="529025"/>
+              </a:xfrm>
+              <a:prstGeom prst="rect">
+                <a:avLst/>
+              </a:prstGeom>
+              <a:solidFill>
+                <a:srgbClr val="FFFFFF"/>
+              </a:solidFill>
+              <a:ln w="28575" cap="flat" cmpd="sng" algn="ctr">
+                <a:solidFill>
+                  <a:srgbClr val="262626">
+                    <a:lumMod val="40000"/>
+                    <a:lumOff val="60000"/>
+                  </a:srgbClr>
+                </a:solidFill>
+                <a:prstDash val="solid"/>
+              </a:ln>
+              <a:effectLst/>
+            </p:spPr>
+            <p:txBody>
+              <a:bodyPr rtlCol="0" anchor="ctr"/>
+              <a:lstStyle/>
+              <a:p>
+                <a:pPr algn="ctr" defTabSz="761183"/>
+                <a:r>
+                  <a:rPr lang="en-US" sz="1400" b="1" kern="0" dirty="0" smtClean="0">
+                    <a:solidFill>
+                      <a:schemeClr val="tx1">
+                        <a:lumMod val="50000"/>
+                        <a:lumOff val="50000"/>
+                      </a:schemeClr>
+                    </a:solidFill>
+                    <a:latin typeface="Segoe UI"/>
+                  </a:rPr>
+                  <a:t>Word Application</a:t>
+                </a:r>
+                <a:endParaRPr lang="en-US" sz="1400" b="1" kern="0" dirty="0">
+                  <a:solidFill>
+                    <a:schemeClr val="tx1">
+                      <a:lumMod val="50000"/>
+                      <a:lumOff val="50000"/>
+                    </a:schemeClr>
+                  </a:solidFill>
+                  <a:latin typeface="Segoe UI"/>
+                </a:endParaRPr>
+              </a:p>
+            </p:txBody>
+          </p:sp>
+        </p:grpSp>
+        <p:sp>
+          <p:nvSpPr>
+            <p:cNvPr id="13" name="Rectangle 12"/>
+            <p:cNvSpPr/>
+            <p:nvPr/>
+          </p:nvSpPr>
+          <p:spPr>
+            <a:xfrm>
+              <a:off x="1253594" y="3686551"/>
+              <a:ext cx="1882896" cy="1716274"/>
+            </a:xfrm>
+            <a:prstGeom prst="rect">
+              <a:avLst/>
+            </a:prstGeom>
+            <a:ln w="19050">
+              <a:solidFill>
+                <a:srgbClr val="4D4D4D">
+                  <a:lumMod val="40000"/>
+                  <a:lumOff val="60000"/>
+                </a:srgbClr>
+              </a:solidFill>
+            </a:ln>
+          </p:spPr>
+          <p:txBody>
+            <a:bodyPr vert="horz" lIns="0" tIns="0" rIns="0" bIns="0" rtlCol="0" anchor="ctr">
+              <a:noAutofit/>
+            </a:bodyPr>
+            <a:lstStyle/>
+            <a:p>
+              <a:pPr algn="ctr" defTabSz="761183">
+                <a:spcBef>
+                  <a:spcPct val="20000"/>
+                </a:spcBef>
+              </a:pPr>
+              <a:r>
+                <a:rPr lang="en-US" sz="2000" kern="0" spc="-67" dirty="0" smtClean="0">
+                  <a:solidFill>
+                    <a:schemeClr val="tx2"/>
+                  </a:solidFill>
+                  <a:latin typeface="Segoe UI Light"/>
+                  <a:ea typeface="Segoe UI" pitchFamily="34" charset="0"/>
+                  <a:cs typeface="Segoe UI" pitchFamily="34" charset="0"/>
+                </a:rPr>
+                <a:t>Document</a:t>
+              </a:r>
+              <a:endParaRPr lang="en-US" sz="2000" kern="0" spc="-67" dirty="0">
+                <a:solidFill>
+                  <a:schemeClr val="tx2"/>
+                </a:solidFill>
+                <a:latin typeface="Segoe UI Light"/>
+                <a:ea typeface="Segoe UI" pitchFamily="34" charset="0"/>
+                <a:cs typeface="Segoe UI" pitchFamily="34" charset="0"/>
+              </a:endParaRPr>
+            </a:p>
+          </p:txBody>
+        </p:sp>
+        <p:grpSp>
+          <p:nvGrpSpPr>
+            <p:cNvPr id="14" name="Group 13"/>
+            <p:cNvGrpSpPr/>
+            <p:nvPr/>
+          </p:nvGrpSpPr>
+          <p:grpSpPr>
+            <a:xfrm>
+              <a:off x="7860405" y="3113563"/>
+              <a:ext cx="2897920" cy="2381305"/>
+              <a:chOff x="8415338" y="3969071"/>
+              <a:chExt cx="3516163" cy="2594233"/>
+            </a:xfrm>
+          </p:grpSpPr>
+          <p:sp>
+            <p:nvSpPr>
+              <p:cNvPr id="57" name="Rectangle 56"/>
+              <p:cNvSpPr/>
+              <p:nvPr/>
+            </p:nvSpPr>
+            <p:spPr>
+              <a:xfrm>
+                <a:off x="8428642" y="3969071"/>
+                <a:ext cx="3502859" cy="2594233"/>
+              </a:xfrm>
+              <a:prstGeom prst="rect">
+                <a:avLst/>
+              </a:prstGeom>
+              <a:solidFill>
+                <a:srgbClr val="FFFFFF"/>
+              </a:solidFill>
+              <a:ln w="28575" cap="flat" cmpd="sng" algn="ctr">
+                <a:solidFill>
+                  <a:srgbClr val="262626">
+                    <a:lumMod val="40000"/>
+                    <a:lumOff val="60000"/>
+                  </a:srgbClr>
+                </a:solidFill>
+                <a:prstDash val="solid"/>
+              </a:ln>
+              <a:effectLst>
+                <a:outerShdw blurRad="50800" dist="38100" dir="2700000" algn="tl" rotWithShape="0">
+                  <a:prstClr val="black">
+                    <a:alpha val="40000"/>
+                  </a:prstClr>
+                </a:outerShdw>
+              </a:effectLst>
+            </p:spPr>
+            <p:txBody>
+              <a:bodyPr rtlCol="0" anchor="ctr"/>
+              <a:lstStyle/>
+              <a:p>
+                <a:pPr algn="ctr" defTabSz="761183"/>
+                <a:endParaRPr lang="en-US" sz="1500" kern="0" dirty="0">
+                  <a:solidFill>
+                    <a:srgbClr val="1B1B1B"/>
+                  </a:solidFill>
+                  <a:latin typeface="Segoe UI"/>
+                </a:endParaRPr>
+              </a:p>
+            </p:txBody>
+          </p:sp>
+          <p:sp>
+            <p:nvSpPr>
+              <p:cNvPr id="58" name="Rectangle 57"/>
+              <p:cNvSpPr/>
+              <p:nvPr/>
+            </p:nvSpPr>
+            <p:spPr>
+              <a:xfrm>
+                <a:off x="8415338" y="3969071"/>
+                <a:ext cx="3516163" cy="529025"/>
+              </a:xfrm>
+              <a:prstGeom prst="rect">
+                <a:avLst/>
+              </a:prstGeom>
+              <a:solidFill>
+                <a:srgbClr val="FFFFFF"/>
+              </a:solidFill>
+              <a:ln w="28575" cap="flat" cmpd="sng" algn="ctr">
+                <a:solidFill>
+                  <a:srgbClr val="262626">
+                    <a:lumMod val="40000"/>
+                    <a:lumOff val="60000"/>
+                  </a:srgbClr>
+                </a:solidFill>
+                <a:prstDash val="solid"/>
+              </a:ln>
+              <a:effectLst/>
+            </p:spPr>
+            <p:txBody>
+              <a:bodyPr rtlCol="0" anchor="ctr"/>
+              <a:lstStyle/>
+              <a:p>
+                <a:pPr algn="ctr" defTabSz="761183"/>
+                <a:r>
+                  <a:rPr lang="en-US" sz="1400" b="1" kern="0" dirty="0" smtClean="0">
+                    <a:solidFill>
+                      <a:schemeClr val="tx1">
+                        <a:lumMod val="50000"/>
+                        <a:lumOff val="50000"/>
+                      </a:schemeClr>
+                    </a:solidFill>
+                  </a:rPr>
+                  <a:t>Outlook Application</a:t>
+                </a:r>
+                <a:endParaRPr lang="en-US" sz="1400" b="1" kern="0" dirty="0">
+                  <a:solidFill>
+                    <a:schemeClr val="tx1">
+                      <a:lumMod val="50000"/>
+                      <a:lumOff val="50000"/>
+                    </a:schemeClr>
+                  </a:solidFill>
+                </a:endParaRPr>
+              </a:p>
+            </p:txBody>
+          </p:sp>
+        </p:grpSp>
+        <p:sp>
+          <p:nvSpPr>
+            <p:cNvPr id="15" name="Rectangle 14"/>
+            <p:cNvSpPr/>
+            <p:nvPr/>
+          </p:nvSpPr>
+          <p:spPr>
+            <a:xfrm>
+              <a:off x="4630974" y="3686551"/>
+              <a:ext cx="2625231" cy="1716274"/>
+            </a:xfrm>
+            <a:prstGeom prst="rect">
+              <a:avLst/>
+            </a:prstGeom>
+            <a:ln w="19050">
+              <a:solidFill>
+                <a:srgbClr val="4D4D4D">
+                  <a:lumMod val="40000"/>
+                  <a:lumOff val="60000"/>
+                </a:srgbClr>
+              </a:solidFill>
+            </a:ln>
+          </p:spPr>
+          <p:txBody>
+            <a:bodyPr vert="horz" lIns="0" tIns="0" rIns="0" bIns="0" rtlCol="0" anchor="t">
+              <a:noAutofit/>
+            </a:bodyPr>
+            <a:lstStyle/>
+            <a:p>
+              <a:pPr algn="ctr" defTabSz="761183">
+                <a:spcBef>
+                  <a:spcPct val="20000"/>
+                </a:spcBef>
+              </a:pPr>
+              <a:r>
+                <a:rPr lang="en-US" sz="2000" kern="0" spc="-67" dirty="0" smtClean="0">
+                  <a:solidFill>
+                    <a:schemeClr val="tx2"/>
+                  </a:solidFill>
+                  <a:latin typeface="Segoe UI Light"/>
+                  <a:ea typeface="Segoe UI" pitchFamily="34" charset="0"/>
+                  <a:cs typeface="Segoe UI" pitchFamily="34" charset="0"/>
+                </a:rPr>
+                <a:t>Document</a:t>
+              </a:r>
+              <a:endParaRPr lang="en-US" sz="2000" kern="0" spc="-67" dirty="0">
+                <a:solidFill>
+                  <a:schemeClr val="tx2"/>
+                </a:solidFill>
+                <a:latin typeface="Segoe UI Light"/>
+                <a:ea typeface="Segoe UI" pitchFamily="34" charset="0"/>
+                <a:cs typeface="Segoe UI" pitchFamily="34" charset="0"/>
+              </a:endParaRPr>
+            </a:p>
+          </p:txBody>
+        </p:sp>
+        <p:sp>
+          <p:nvSpPr>
+            <p:cNvPr id="16" name="Rectangle 15"/>
+            <p:cNvSpPr/>
+            <p:nvPr/>
+          </p:nvSpPr>
+          <p:spPr>
+            <a:xfrm>
+              <a:off x="7996750" y="3686551"/>
+              <a:ext cx="1196412" cy="1716274"/>
+            </a:xfrm>
+            <a:prstGeom prst="rect">
+              <a:avLst/>
+            </a:prstGeom>
+            <a:ln w="19050">
+              <a:solidFill>
+                <a:srgbClr val="4D4D4D">
+                  <a:lumMod val="40000"/>
+                  <a:lumOff val="60000"/>
+                </a:srgbClr>
+              </a:solidFill>
+            </a:ln>
+          </p:spPr>
+          <p:txBody>
+            <a:bodyPr vert="horz" lIns="0" tIns="0" rIns="0" bIns="0" rtlCol="0" anchor="t">
+              <a:noAutofit/>
+            </a:bodyPr>
+            <a:lstStyle/>
+            <a:p>
+              <a:pPr algn="ctr" defTabSz="761183">
+                <a:spcBef>
+                  <a:spcPct val="20000"/>
+                </a:spcBef>
+              </a:pPr>
+              <a:r>
+                <a:rPr lang="en-US" sz="1400" kern="0" spc="-67" dirty="0" smtClean="0">
+                  <a:solidFill>
+                    <a:schemeClr val="tx2"/>
+                  </a:solidFill>
+                  <a:latin typeface="Segoe UI Light"/>
+                  <a:ea typeface="Segoe UI" pitchFamily="34" charset="0"/>
+                  <a:cs typeface="Segoe UI" pitchFamily="34" charset="0"/>
+                </a:rPr>
+                <a:t>Inbox</a:t>
+              </a:r>
+              <a:endParaRPr lang="en-US" sz="1400" kern="0" spc="-67" dirty="0">
+                <a:solidFill>
+                  <a:schemeClr val="tx2"/>
+                </a:solidFill>
+                <a:latin typeface="Segoe UI Light"/>
+                <a:ea typeface="Segoe UI" pitchFamily="34" charset="0"/>
+                <a:cs typeface="Segoe UI" pitchFamily="34" charset="0"/>
+              </a:endParaRPr>
+            </a:p>
+          </p:txBody>
+        </p:sp>
+        <p:sp>
+          <p:nvSpPr>
+            <p:cNvPr id="17" name="Rectangle 16"/>
+            <p:cNvSpPr/>
+            <p:nvPr/>
+          </p:nvSpPr>
+          <p:spPr>
+            <a:xfrm>
+              <a:off x="9306926" y="3686551"/>
+              <a:ext cx="1302080" cy="1716274"/>
+            </a:xfrm>
+            <a:prstGeom prst="rect">
+              <a:avLst/>
+            </a:prstGeom>
+            <a:ln w="19050">
+              <a:solidFill>
+                <a:srgbClr val="4D4D4D">
+                  <a:lumMod val="40000"/>
+                  <a:lumOff val="60000"/>
+                </a:srgbClr>
+              </a:solidFill>
+            </a:ln>
+          </p:spPr>
+          <p:txBody>
+            <a:bodyPr vert="horz" lIns="0" tIns="0" rIns="0" bIns="0" rtlCol="0" anchor="t">
+              <a:noAutofit/>
+            </a:bodyPr>
+            <a:lstStyle/>
+            <a:p>
+              <a:pPr algn="ctr" defTabSz="761183">
+                <a:spcBef>
+                  <a:spcPct val="20000"/>
+                </a:spcBef>
+              </a:pPr>
+              <a:r>
+                <a:rPr lang="en-US" sz="1400" kern="0" spc="-67" dirty="0" smtClean="0">
+                  <a:solidFill>
+                    <a:schemeClr val="tx2"/>
+                  </a:solidFill>
+                  <a:latin typeface="Segoe UI Light"/>
+                  <a:ea typeface="Segoe UI" pitchFamily="34" charset="0"/>
+                  <a:cs typeface="Segoe UI" pitchFamily="34" charset="0"/>
+                </a:rPr>
+                <a:t>Selected Message</a:t>
+              </a:r>
+              <a:endParaRPr lang="en-US" sz="1400" kern="0" spc="-67" dirty="0">
+                <a:solidFill>
+                  <a:schemeClr val="tx2"/>
+                </a:solidFill>
+                <a:latin typeface="Segoe UI Light"/>
+                <a:ea typeface="Segoe UI" pitchFamily="34" charset="0"/>
+                <a:cs typeface="Segoe UI" pitchFamily="34" charset="0"/>
+              </a:endParaRPr>
+            </a:p>
+          </p:txBody>
+        </p:sp>
+        <p:sp>
+          <p:nvSpPr>
+            <p:cNvPr id="18" name="Rectangle 17"/>
+            <p:cNvSpPr/>
+            <p:nvPr/>
+          </p:nvSpPr>
+          <p:spPr>
+            <a:xfrm>
+              <a:off x="3245742" y="3599166"/>
+              <a:ext cx="827033" cy="1895701"/>
+            </a:xfrm>
+            <a:prstGeom prst="rect">
+              <a:avLst/>
+            </a:prstGeom>
+            <a:gradFill>
+              <a:gsLst>
+                <a:gs pos="0">
+                  <a:schemeClr val="accent1">
+                    <a:lumMod val="5000"/>
+                    <a:lumOff val="95000"/>
+                  </a:schemeClr>
+                </a:gs>
+                <a:gs pos="74000">
+                  <a:schemeClr val="accent1">
+                    <a:lumMod val="45000"/>
+                    <a:lumOff val="55000"/>
+                  </a:schemeClr>
+                </a:gs>
+                <a:gs pos="83000">
+                  <a:schemeClr val="accent1">
+                    <a:lumMod val="45000"/>
+                    <a:lumOff val="55000"/>
+                  </a:schemeClr>
+                </a:gs>
+                <a:gs pos="100000">
+                  <a:schemeClr val="accent1">
+                    <a:lumMod val="30000"/>
+                    <a:lumOff val="70000"/>
+                  </a:schemeClr>
+                </a:gs>
+              </a:gsLst>
+              <a:lin ang="5400000" scaled="1"/>
+            </a:gradFill>
+            <a:ln w="19050">
+              <a:solidFill>
+                <a:srgbClr val="4D4D4D">
+                  <a:lumMod val="40000"/>
+                  <a:lumOff val="60000"/>
+                </a:srgbClr>
+              </a:solidFill>
+            </a:ln>
+          </p:spPr>
+          <p:txBody>
+            <a:bodyPr vert="horz" lIns="0" tIns="0" rIns="0" bIns="0" rtlCol="0" anchor="ctr">
+              <a:noAutofit/>
+            </a:bodyPr>
+            <a:lstStyle/>
+            <a:p>
+              <a:pPr algn="ctr" defTabSz="761183">
+                <a:spcBef>
+                  <a:spcPct val="20000"/>
+                </a:spcBef>
+              </a:pPr>
+              <a:r>
+                <a:rPr lang="en-US" sz="1400" kern="0" spc="-67" dirty="0" smtClean="0">
+                  <a:latin typeface="Segoe UI Light"/>
+                  <a:ea typeface="Segoe UI" pitchFamily="34" charset="0"/>
+                  <a:cs typeface="Segoe UI" pitchFamily="34" charset="0"/>
+                </a:rPr>
+                <a:t>Task Pane App</a:t>
+              </a:r>
+              <a:endParaRPr lang="en-US" sz="1400" kern="0" spc="-67" dirty="0">
+                <a:latin typeface="Segoe UI Light"/>
+                <a:ea typeface="Segoe UI" pitchFamily="34" charset="0"/>
+                <a:cs typeface="Segoe UI" pitchFamily="34" charset="0"/>
+              </a:endParaRPr>
+            </a:p>
+          </p:txBody>
+        </p:sp>
+        <p:sp>
+          <p:nvSpPr>
+            <p:cNvPr id="19" name="Rectangle 18"/>
+            <p:cNvSpPr/>
+            <p:nvPr/>
+          </p:nvSpPr>
+          <p:spPr>
+            <a:xfrm>
+              <a:off x="6217244" y="4705295"/>
+              <a:ext cx="930808" cy="613957"/>
+            </a:xfrm>
+            <a:prstGeom prst="rect">
+              <a:avLst/>
+            </a:prstGeom>
+            <a:gradFill>
+              <a:gsLst>
+                <a:gs pos="0">
+                  <a:schemeClr val="accent1">
+                    <a:lumMod val="5000"/>
+                    <a:lumOff val="95000"/>
+                  </a:schemeClr>
+                </a:gs>
+                <a:gs pos="74000">
+                  <a:schemeClr val="accent1">
+                    <a:lumMod val="45000"/>
+                    <a:lumOff val="55000"/>
+                  </a:schemeClr>
+                </a:gs>
+                <a:gs pos="83000">
+                  <a:schemeClr val="accent1">
+                    <a:lumMod val="45000"/>
+                    <a:lumOff val="55000"/>
+                  </a:schemeClr>
+                </a:gs>
+                <a:gs pos="100000">
+                  <a:schemeClr val="accent1">
+                    <a:lumMod val="30000"/>
+                    <a:lumOff val="70000"/>
+                  </a:schemeClr>
+                </a:gs>
+              </a:gsLst>
+              <a:lin ang="5400000" scaled="1"/>
+            </a:gradFill>
+            <a:ln w="19050">
+              <a:solidFill>
+                <a:srgbClr val="4D4D4D">
+                  <a:lumMod val="40000"/>
+                  <a:lumOff val="60000"/>
+                </a:srgbClr>
+              </a:solidFill>
+            </a:ln>
+          </p:spPr>
+          <p:txBody>
+            <a:bodyPr vert="horz" lIns="0" tIns="0" rIns="0" bIns="0" rtlCol="0" anchor="ctr">
+              <a:noAutofit/>
+            </a:bodyPr>
+            <a:lstStyle/>
+            <a:p>
+              <a:pPr algn="ctr" defTabSz="761183">
+                <a:spcBef>
+                  <a:spcPct val="20000"/>
+                </a:spcBef>
+              </a:pPr>
+              <a:r>
+                <a:rPr lang="en-US" sz="1400" kern="0" spc="-67" dirty="0" smtClean="0">
+                  <a:latin typeface="Segoe UI Light"/>
+                  <a:ea typeface="Segoe UI" pitchFamily="34" charset="0"/>
+                  <a:cs typeface="Segoe UI" pitchFamily="34" charset="0"/>
+                </a:rPr>
+                <a:t>Content </a:t>
+              </a:r>
+              <a:br>
+                <a:rPr lang="en-US" sz="1400" kern="0" spc="-67" dirty="0" smtClean="0">
+                  <a:latin typeface="Segoe UI Light"/>
+                  <a:ea typeface="Segoe UI" pitchFamily="34" charset="0"/>
+                  <a:cs typeface="Segoe UI" pitchFamily="34" charset="0"/>
+                </a:rPr>
+              </a:br>
+              <a:r>
+                <a:rPr lang="en-US" sz="1400" kern="0" spc="-67" dirty="0" smtClean="0">
+                  <a:latin typeface="Segoe UI Light"/>
+                  <a:ea typeface="Segoe UI" pitchFamily="34" charset="0"/>
+                  <a:cs typeface="Segoe UI" pitchFamily="34" charset="0"/>
+                </a:rPr>
+                <a:t>App</a:t>
+              </a:r>
+              <a:endParaRPr lang="en-US" sz="1400" kern="0" spc="-67" dirty="0">
+                <a:latin typeface="Segoe UI Light"/>
+                <a:ea typeface="Segoe UI" pitchFamily="34" charset="0"/>
+                <a:cs typeface="Segoe UI" pitchFamily="34" charset="0"/>
+              </a:endParaRPr>
+            </a:p>
+          </p:txBody>
+        </p:sp>
+        <p:sp>
+          <p:nvSpPr>
+            <p:cNvPr id="20" name="Rectangle 19"/>
+            <p:cNvSpPr/>
+            <p:nvPr/>
+          </p:nvSpPr>
+          <p:spPr>
+            <a:xfrm>
+              <a:off x="9418994" y="4168749"/>
+              <a:ext cx="1091689" cy="413084"/>
+            </a:xfrm>
+            <a:prstGeom prst="rect">
+              <a:avLst/>
+            </a:prstGeom>
+            <a:gradFill>
+              <a:gsLst>
+                <a:gs pos="0">
+                  <a:schemeClr val="accent1">
+                    <a:lumMod val="5000"/>
+                    <a:lumOff val="95000"/>
+                  </a:schemeClr>
+                </a:gs>
+                <a:gs pos="74000">
+                  <a:schemeClr val="accent1">
+                    <a:lumMod val="45000"/>
+                    <a:lumOff val="55000"/>
+                  </a:schemeClr>
+                </a:gs>
+                <a:gs pos="83000">
+                  <a:schemeClr val="accent1">
+                    <a:lumMod val="45000"/>
+                    <a:lumOff val="55000"/>
+                  </a:schemeClr>
+                </a:gs>
+                <a:gs pos="100000">
+                  <a:schemeClr val="accent1">
+                    <a:lumMod val="30000"/>
+                    <a:lumOff val="70000"/>
+                  </a:schemeClr>
+                </a:gs>
+              </a:gsLst>
+              <a:lin ang="5400000" scaled="1"/>
+            </a:gradFill>
+            <a:ln w="19050">
+              <a:solidFill>
+                <a:srgbClr val="4D4D4D">
+                  <a:lumMod val="40000"/>
+                  <a:lumOff val="60000"/>
+                </a:srgbClr>
+              </a:solidFill>
+            </a:ln>
+          </p:spPr>
+          <p:txBody>
+            <a:bodyPr vert="horz" lIns="0" tIns="0" rIns="0" bIns="0" rtlCol="0" anchor="ctr">
+              <a:noAutofit/>
+            </a:bodyPr>
+            <a:lstStyle/>
+            <a:p>
+              <a:pPr algn="ctr" defTabSz="761183">
+                <a:spcBef>
+                  <a:spcPct val="20000"/>
+                </a:spcBef>
+              </a:pPr>
+              <a:r>
+                <a:rPr lang="en-US" sz="1400" kern="0" spc="-67" dirty="0" smtClean="0">
+                  <a:latin typeface="Segoe UI Light"/>
+                  <a:ea typeface="Segoe UI" pitchFamily="34" charset="0"/>
+                  <a:cs typeface="Segoe UI" pitchFamily="34" charset="0"/>
+                </a:rPr>
+                <a:t>Mail App</a:t>
+              </a:r>
+              <a:endParaRPr lang="en-US" sz="1400" kern="0" spc="-67" dirty="0">
+                <a:latin typeface="Segoe UI Light"/>
+                <a:ea typeface="Segoe UI" pitchFamily="34" charset="0"/>
+                <a:cs typeface="Segoe UI" pitchFamily="34" charset="0"/>
+              </a:endParaRPr>
+            </a:p>
+          </p:txBody>
+        </p:sp>
+        <p:cxnSp>
+          <p:nvCxnSpPr>
+            <p:cNvPr id="21" name="Straight Connector 20"/>
+            <p:cNvCxnSpPr/>
+            <p:nvPr/>
+          </p:nvCxnSpPr>
+          <p:spPr>
+            <a:xfrm>
+              <a:off x="1337187" y="3836890"/>
+              <a:ext cx="1651819" cy="0"/>
+            </a:xfrm>
+            <a:prstGeom prst="line">
+              <a:avLst/>
+            </a:prstGeom>
+            <a:ln>
+              <a:solidFill>
+                <a:schemeClr val="bg1">
+                  <a:lumMod val="65000"/>
+                </a:schemeClr>
+              </a:solidFill>
+              <a:headEnd type="none"/>
+              <a:tailEnd type="none"/>
+            </a:ln>
+          </p:spPr>
+          <p:style>
+            <a:lnRef idx="1">
+              <a:schemeClr val="accent1"/>
+            </a:lnRef>
+            <a:fillRef idx="0">
+              <a:schemeClr val="accent1"/>
+            </a:fillRef>
+            <a:effectRef idx="0">
+              <a:schemeClr val="accent1"/>
+            </a:effectRef>
+            <a:fontRef idx="minor">
+              <a:schemeClr val="tx1"/>
+            </a:fontRef>
+          </p:style>
+        </p:cxnSp>
+        <p:cxnSp>
+          <p:nvCxnSpPr>
+            <p:cNvPr id="22" name="Straight Connector 21"/>
+            <p:cNvCxnSpPr/>
+            <p:nvPr/>
+          </p:nvCxnSpPr>
+          <p:spPr>
+            <a:xfrm>
+              <a:off x="1337187" y="3993019"/>
+              <a:ext cx="1651819" cy="0"/>
+            </a:xfrm>
+            <a:prstGeom prst="line">
+              <a:avLst/>
+            </a:prstGeom>
+            <a:ln>
+              <a:solidFill>
+                <a:schemeClr val="bg1">
+                  <a:lumMod val="65000"/>
+                </a:schemeClr>
+              </a:solidFill>
+              <a:headEnd type="none"/>
+              <a:tailEnd type="none"/>
+            </a:ln>
+          </p:spPr>
+          <p:style>
+            <a:lnRef idx="1">
+              <a:schemeClr val="accent1"/>
+            </a:lnRef>
+            <a:fillRef idx="0">
+              <a:schemeClr val="accent1"/>
+            </a:fillRef>
+            <a:effectRef idx="0">
+              <a:schemeClr val="accent1"/>
+            </a:effectRef>
+            <a:fontRef idx="minor">
+              <a:schemeClr val="tx1"/>
+            </a:fontRef>
+          </p:style>
+        </p:cxnSp>
+        <p:cxnSp>
+          <p:nvCxnSpPr>
+            <p:cNvPr id="23" name="Straight Connector 22"/>
+            <p:cNvCxnSpPr/>
+            <p:nvPr/>
+          </p:nvCxnSpPr>
+          <p:spPr>
+            <a:xfrm>
+              <a:off x="1337187" y="4155251"/>
+              <a:ext cx="1651819" cy="0"/>
+            </a:xfrm>
+            <a:prstGeom prst="line">
+              <a:avLst/>
+            </a:prstGeom>
+            <a:ln>
+              <a:solidFill>
+                <a:schemeClr val="bg1">
+                  <a:lumMod val="65000"/>
+                </a:schemeClr>
+              </a:solidFill>
+              <a:headEnd type="none"/>
+              <a:tailEnd type="none"/>
+            </a:ln>
+          </p:spPr>
+          <p:style>
+            <a:lnRef idx="1">
+              <a:schemeClr val="accent1"/>
+            </a:lnRef>
+            <a:fillRef idx="0">
+              <a:schemeClr val="accent1"/>
+            </a:fillRef>
+            <a:effectRef idx="0">
+              <a:schemeClr val="accent1"/>
+            </a:effectRef>
+            <a:fontRef idx="minor">
+              <a:schemeClr val="tx1"/>
+            </a:fontRef>
+          </p:style>
+        </p:cxnSp>
+        <p:cxnSp>
+          <p:nvCxnSpPr>
+            <p:cNvPr id="24" name="Straight Connector 23"/>
+            <p:cNvCxnSpPr/>
+            <p:nvPr/>
+          </p:nvCxnSpPr>
+          <p:spPr>
+            <a:xfrm>
+              <a:off x="1337187" y="4337147"/>
+              <a:ext cx="1651819" cy="0"/>
+            </a:xfrm>
+            <a:prstGeom prst="line">
+              <a:avLst/>
+            </a:prstGeom>
+            <a:ln>
+              <a:solidFill>
+                <a:schemeClr val="bg1">
+                  <a:lumMod val="65000"/>
+                </a:schemeClr>
+              </a:solidFill>
+              <a:headEnd type="none"/>
+              <a:tailEnd type="none"/>
+            </a:ln>
+          </p:spPr>
+          <p:style>
+            <a:lnRef idx="1">
+              <a:schemeClr val="accent1"/>
+            </a:lnRef>
+            <a:fillRef idx="0">
+              <a:schemeClr val="accent1"/>
+            </a:fillRef>
+            <a:effectRef idx="0">
+              <a:schemeClr val="accent1"/>
+            </a:effectRef>
+            <a:fontRef idx="minor">
+              <a:schemeClr val="tx1"/>
+            </a:fontRef>
+          </p:style>
+        </p:cxnSp>
+        <p:cxnSp>
+          <p:nvCxnSpPr>
+            <p:cNvPr id="25" name="Straight Connector 24"/>
+            <p:cNvCxnSpPr/>
+            <p:nvPr/>
+          </p:nvCxnSpPr>
+          <p:spPr>
+            <a:xfrm>
+              <a:off x="1337187" y="4705295"/>
+              <a:ext cx="1651819" cy="0"/>
+            </a:xfrm>
+            <a:prstGeom prst="line">
+              <a:avLst/>
+            </a:prstGeom>
+            <a:ln>
+              <a:solidFill>
+                <a:schemeClr val="bg1">
+                  <a:lumMod val="65000"/>
+                </a:schemeClr>
+              </a:solidFill>
+              <a:headEnd type="none"/>
+              <a:tailEnd type="none"/>
+            </a:ln>
+          </p:spPr>
+          <p:style>
+            <a:lnRef idx="1">
+              <a:schemeClr val="accent1"/>
+            </a:lnRef>
+            <a:fillRef idx="0">
+              <a:schemeClr val="accent1"/>
+            </a:fillRef>
+            <a:effectRef idx="0">
+              <a:schemeClr val="accent1"/>
+            </a:effectRef>
+            <a:fontRef idx="minor">
+              <a:schemeClr val="tx1"/>
+            </a:fontRef>
+          </p:style>
+        </p:cxnSp>
+        <p:cxnSp>
+          <p:nvCxnSpPr>
+            <p:cNvPr id="26" name="Straight Connector 25"/>
+            <p:cNvCxnSpPr/>
+            <p:nvPr/>
+          </p:nvCxnSpPr>
+          <p:spPr>
+            <a:xfrm>
+              <a:off x="1337187" y="4897024"/>
+              <a:ext cx="1651819" cy="0"/>
+            </a:xfrm>
+            <a:prstGeom prst="line">
+              <a:avLst/>
+            </a:prstGeom>
+            <a:ln>
+              <a:solidFill>
+                <a:schemeClr val="bg1">
+                  <a:lumMod val="65000"/>
+                </a:schemeClr>
+              </a:solidFill>
+              <a:headEnd type="none"/>
+              <a:tailEnd type="none"/>
+            </a:ln>
+          </p:spPr>
+          <p:style>
+            <a:lnRef idx="1">
+              <a:schemeClr val="accent1"/>
+            </a:lnRef>
+            <a:fillRef idx="0">
+              <a:schemeClr val="accent1"/>
+            </a:fillRef>
+            <a:effectRef idx="0">
+              <a:schemeClr val="accent1"/>
+            </a:effectRef>
+            <a:fontRef idx="minor">
+              <a:schemeClr val="tx1"/>
+            </a:fontRef>
+          </p:style>
+        </p:cxnSp>
+        <p:cxnSp>
+          <p:nvCxnSpPr>
+            <p:cNvPr id="27" name="Straight Connector 26"/>
+            <p:cNvCxnSpPr/>
+            <p:nvPr/>
+          </p:nvCxnSpPr>
+          <p:spPr>
+            <a:xfrm>
+              <a:off x="1337187" y="5078921"/>
+              <a:ext cx="1651819" cy="0"/>
+            </a:xfrm>
+            <a:prstGeom prst="line">
+              <a:avLst/>
+            </a:prstGeom>
+            <a:ln>
+              <a:solidFill>
+                <a:schemeClr val="bg1">
+                  <a:lumMod val="65000"/>
+                </a:schemeClr>
+              </a:solidFill>
+              <a:headEnd type="none"/>
+              <a:tailEnd type="none"/>
+            </a:ln>
+          </p:spPr>
+          <p:style>
+            <a:lnRef idx="1">
+              <a:schemeClr val="accent1"/>
+            </a:lnRef>
+            <a:fillRef idx="0">
+              <a:schemeClr val="accent1"/>
+            </a:fillRef>
+            <a:effectRef idx="0">
+              <a:schemeClr val="accent1"/>
+            </a:effectRef>
+            <a:fontRef idx="minor">
+              <a:schemeClr val="tx1"/>
+            </a:fontRef>
+          </p:style>
+        </p:cxnSp>
+        <p:cxnSp>
+          <p:nvCxnSpPr>
+            <p:cNvPr id="28" name="Straight Connector 27"/>
+            <p:cNvCxnSpPr/>
+            <p:nvPr/>
+          </p:nvCxnSpPr>
+          <p:spPr>
+            <a:xfrm>
+              <a:off x="1337187" y="5241153"/>
+              <a:ext cx="1651819" cy="0"/>
+            </a:xfrm>
+            <a:prstGeom prst="line">
+              <a:avLst/>
+            </a:prstGeom>
+            <a:ln>
+              <a:solidFill>
+                <a:schemeClr val="bg1">
+                  <a:lumMod val="65000"/>
+                </a:schemeClr>
+              </a:solidFill>
+              <a:headEnd type="none"/>
+              <a:tailEnd type="none"/>
+            </a:ln>
+          </p:spPr>
+          <p:style>
+            <a:lnRef idx="1">
+              <a:schemeClr val="accent1"/>
+            </a:lnRef>
+            <a:fillRef idx="0">
+              <a:schemeClr val="accent1"/>
+            </a:fillRef>
+            <a:effectRef idx="0">
+              <a:schemeClr val="accent1"/>
+            </a:effectRef>
+            <a:fontRef idx="minor">
+              <a:schemeClr val="tx1"/>
+            </a:fontRef>
+          </p:style>
+        </p:cxnSp>
+        <p:cxnSp>
+          <p:nvCxnSpPr>
+            <p:cNvPr id="29" name="Straight Connector 28"/>
+            <p:cNvCxnSpPr/>
+            <p:nvPr/>
+          </p:nvCxnSpPr>
+          <p:spPr>
+            <a:xfrm>
+              <a:off x="4768645" y="3993019"/>
+              <a:ext cx="2379407" cy="0"/>
+            </a:xfrm>
+            <a:prstGeom prst="line">
+              <a:avLst/>
+            </a:prstGeom>
+            <a:ln>
+              <a:solidFill>
+                <a:schemeClr val="bg1">
+                  <a:lumMod val="65000"/>
+                </a:schemeClr>
+              </a:solidFill>
+              <a:headEnd type="none"/>
+              <a:tailEnd type="none"/>
+            </a:ln>
+          </p:spPr>
+          <p:style>
+            <a:lnRef idx="1">
+              <a:schemeClr val="accent1"/>
+            </a:lnRef>
+            <a:fillRef idx="0">
+              <a:schemeClr val="accent1"/>
+            </a:fillRef>
+            <a:effectRef idx="0">
+              <a:schemeClr val="accent1"/>
+            </a:effectRef>
+            <a:fontRef idx="minor">
+              <a:schemeClr val="tx1"/>
+            </a:fontRef>
+          </p:style>
+        </p:cxnSp>
+        <p:cxnSp>
+          <p:nvCxnSpPr>
+            <p:cNvPr id="30" name="Straight Connector 29"/>
+            <p:cNvCxnSpPr/>
+            <p:nvPr/>
+          </p:nvCxnSpPr>
+          <p:spPr>
+            <a:xfrm>
+              <a:off x="4768645" y="4155251"/>
+              <a:ext cx="2379407" cy="0"/>
+            </a:xfrm>
+            <a:prstGeom prst="line">
+              <a:avLst/>
+            </a:prstGeom>
+            <a:ln>
+              <a:solidFill>
+                <a:schemeClr val="bg1">
+                  <a:lumMod val="65000"/>
+                </a:schemeClr>
+              </a:solidFill>
+              <a:headEnd type="none"/>
+              <a:tailEnd type="none"/>
+            </a:ln>
+          </p:spPr>
+          <p:style>
+            <a:lnRef idx="1">
+              <a:schemeClr val="accent1"/>
+            </a:lnRef>
+            <a:fillRef idx="0">
+              <a:schemeClr val="accent1"/>
+            </a:fillRef>
+            <a:effectRef idx="0">
+              <a:schemeClr val="accent1"/>
+            </a:effectRef>
+            <a:fontRef idx="minor">
+              <a:schemeClr val="tx1"/>
+            </a:fontRef>
+          </p:style>
+        </p:cxnSp>
+        <p:cxnSp>
+          <p:nvCxnSpPr>
+            <p:cNvPr id="31" name="Straight Connector 30"/>
+            <p:cNvCxnSpPr/>
+            <p:nvPr/>
+          </p:nvCxnSpPr>
+          <p:spPr>
+            <a:xfrm>
+              <a:off x="4768645" y="4337147"/>
+              <a:ext cx="2379407" cy="0"/>
+            </a:xfrm>
+            <a:prstGeom prst="line">
+              <a:avLst/>
+            </a:prstGeom>
+            <a:ln>
+              <a:solidFill>
+                <a:schemeClr val="bg1">
+                  <a:lumMod val="65000"/>
+                </a:schemeClr>
+              </a:solidFill>
+              <a:headEnd type="none"/>
+              <a:tailEnd type="none"/>
+            </a:ln>
+          </p:spPr>
+          <p:style>
+            <a:lnRef idx="1">
+              <a:schemeClr val="accent1"/>
+            </a:lnRef>
+            <a:fillRef idx="0">
+              <a:schemeClr val="accent1"/>
+            </a:fillRef>
+            <a:effectRef idx="0">
+              <a:schemeClr val="accent1"/>
+            </a:effectRef>
+            <a:fontRef idx="minor">
+              <a:schemeClr val="tx1"/>
+            </a:fontRef>
+          </p:style>
+        </p:cxnSp>
+        <p:cxnSp>
+          <p:nvCxnSpPr>
+            <p:cNvPr id="32" name="Straight Connector 31"/>
+            <p:cNvCxnSpPr/>
+            <p:nvPr/>
+          </p:nvCxnSpPr>
+          <p:spPr>
+            <a:xfrm>
+              <a:off x="4768645" y="4484631"/>
+              <a:ext cx="2379407" cy="0"/>
+            </a:xfrm>
+            <a:prstGeom prst="line">
+              <a:avLst/>
+            </a:prstGeom>
+            <a:ln>
+              <a:solidFill>
+                <a:schemeClr val="bg1">
+                  <a:lumMod val="65000"/>
+                </a:schemeClr>
+              </a:solidFill>
+              <a:headEnd type="none"/>
+              <a:tailEnd type="none"/>
+            </a:ln>
+          </p:spPr>
+          <p:style>
+            <a:lnRef idx="1">
+              <a:schemeClr val="accent1"/>
+            </a:lnRef>
+            <a:fillRef idx="0">
+              <a:schemeClr val="accent1"/>
+            </a:fillRef>
+            <a:effectRef idx="0">
+              <a:schemeClr val="accent1"/>
+            </a:effectRef>
+            <a:fontRef idx="minor">
+              <a:schemeClr val="tx1"/>
+            </a:fontRef>
+          </p:style>
+        </p:cxnSp>
+        <p:cxnSp>
+          <p:nvCxnSpPr>
+            <p:cNvPr id="33" name="Straight Connector 32"/>
+            <p:cNvCxnSpPr/>
+            <p:nvPr/>
+          </p:nvCxnSpPr>
+          <p:spPr>
+            <a:xfrm>
+              <a:off x="4768645" y="4640825"/>
+              <a:ext cx="2379407" cy="0"/>
+            </a:xfrm>
+            <a:prstGeom prst="line">
+              <a:avLst/>
+            </a:prstGeom>
+            <a:ln>
+              <a:solidFill>
+                <a:schemeClr val="bg1">
+                  <a:lumMod val="65000"/>
+                </a:schemeClr>
+              </a:solidFill>
+              <a:headEnd type="none"/>
+              <a:tailEnd type="none"/>
+            </a:ln>
+          </p:spPr>
+          <p:style>
+            <a:lnRef idx="1">
+              <a:schemeClr val="accent1"/>
+            </a:lnRef>
+            <a:fillRef idx="0">
+              <a:schemeClr val="accent1"/>
+            </a:fillRef>
+            <a:effectRef idx="0">
+              <a:schemeClr val="accent1"/>
+            </a:effectRef>
+            <a:fontRef idx="minor">
+              <a:schemeClr val="tx1"/>
+            </a:fontRef>
+          </p:style>
+        </p:cxnSp>
+        <p:cxnSp>
+          <p:nvCxnSpPr>
+            <p:cNvPr id="34" name="Straight Connector 33"/>
+            <p:cNvCxnSpPr/>
+            <p:nvPr/>
+          </p:nvCxnSpPr>
+          <p:spPr>
+            <a:xfrm>
+              <a:off x="4768645" y="4804179"/>
+              <a:ext cx="1337187" cy="13627"/>
+            </a:xfrm>
+            <a:prstGeom prst="line">
+              <a:avLst/>
+            </a:prstGeom>
+            <a:ln>
+              <a:solidFill>
+                <a:schemeClr val="bg1">
+                  <a:lumMod val="65000"/>
+                </a:schemeClr>
+              </a:solidFill>
+              <a:headEnd type="none"/>
+              <a:tailEnd type="none"/>
+            </a:ln>
+          </p:spPr>
+          <p:style>
+            <a:lnRef idx="1">
+              <a:schemeClr val="accent1"/>
+            </a:lnRef>
+            <a:fillRef idx="0">
+              <a:schemeClr val="accent1"/>
+            </a:fillRef>
+            <a:effectRef idx="0">
+              <a:schemeClr val="accent1"/>
+            </a:effectRef>
+            <a:fontRef idx="minor">
+              <a:schemeClr val="tx1"/>
+            </a:fontRef>
+          </p:style>
+        </p:cxnSp>
+        <p:cxnSp>
+          <p:nvCxnSpPr>
+            <p:cNvPr id="35" name="Straight Connector 34"/>
+            <p:cNvCxnSpPr/>
+            <p:nvPr/>
+          </p:nvCxnSpPr>
+          <p:spPr>
+            <a:xfrm>
+              <a:off x="4766293" y="4963243"/>
+              <a:ext cx="1337187" cy="13627"/>
+            </a:xfrm>
+            <a:prstGeom prst="line">
+              <a:avLst/>
+            </a:prstGeom>
+            <a:ln>
+              <a:solidFill>
+                <a:schemeClr val="bg1">
+                  <a:lumMod val="65000"/>
+                </a:schemeClr>
+              </a:solidFill>
+              <a:headEnd type="none"/>
+              <a:tailEnd type="none"/>
+            </a:ln>
+          </p:spPr>
+          <p:style>
+            <a:lnRef idx="1">
+              <a:schemeClr val="accent1"/>
+            </a:lnRef>
+            <a:fillRef idx="0">
+              <a:schemeClr val="accent1"/>
+            </a:fillRef>
+            <a:effectRef idx="0">
+              <a:schemeClr val="accent1"/>
+            </a:effectRef>
+            <a:fontRef idx="minor">
+              <a:schemeClr val="tx1"/>
+            </a:fontRef>
+          </p:style>
+        </p:cxnSp>
+        <p:cxnSp>
+          <p:nvCxnSpPr>
+            <p:cNvPr id="36" name="Straight Connector 35"/>
+            <p:cNvCxnSpPr/>
+            <p:nvPr/>
+          </p:nvCxnSpPr>
+          <p:spPr>
+            <a:xfrm>
+              <a:off x="4766293" y="5133409"/>
+              <a:ext cx="1337187" cy="13627"/>
+            </a:xfrm>
+            <a:prstGeom prst="line">
+              <a:avLst/>
+            </a:prstGeom>
+            <a:ln>
+              <a:solidFill>
+                <a:schemeClr val="bg1">
+                  <a:lumMod val="65000"/>
+                </a:schemeClr>
+              </a:solidFill>
+              <a:headEnd type="none"/>
+              <a:tailEnd type="none"/>
+            </a:ln>
+          </p:spPr>
+          <p:style>
+            <a:lnRef idx="1">
+              <a:schemeClr val="accent1"/>
+            </a:lnRef>
+            <a:fillRef idx="0">
+              <a:schemeClr val="accent1"/>
+            </a:fillRef>
+            <a:effectRef idx="0">
+              <a:schemeClr val="accent1"/>
+            </a:effectRef>
+            <a:fontRef idx="minor">
+              <a:schemeClr val="tx1"/>
+            </a:fontRef>
+          </p:style>
+        </p:cxnSp>
+        <p:cxnSp>
+          <p:nvCxnSpPr>
+            <p:cNvPr id="37" name="Straight Connector 36"/>
+            <p:cNvCxnSpPr/>
+            <p:nvPr/>
+          </p:nvCxnSpPr>
+          <p:spPr>
+            <a:xfrm>
+              <a:off x="8081807" y="3977344"/>
+              <a:ext cx="1003199" cy="15675"/>
+            </a:xfrm>
+            <a:prstGeom prst="line">
+              <a:avLst/>
+            </a:prstGeom>
+            <a:ln>
+              <a:solidFill>
+                <a:schemeClr val="bg1">
+                  <a:lumMod val="65000"/>
+                </a:schemeClr>
+              </a:solidFill>
+              <a:headEnd type="none"/>
+              <a:tailEnd type="none"/>
+            </a:ln>
+          </p:spPr>
+          <p:style>
+            <a:lnRef idx="1">
+              <a:schemeClr val="accent1"/>
+            </a:lnRef>
+            <a:fillRef idx="0">
+              <a:schemeClr val="accent1"/>
+            </a:fillRef>
+            <a:effectRef idx="0">
+              <a:schemeClr val="accent1"/>
+            </a:effectRef>
+            <a:fontRef idx="minor">
+              <a:schemeClr val="tx1"/>
+            </a:fontRef>
+          </p:style>
+        </p:cxnSp>
+        <p:cxnSp>
+          <p:nvCxnSpPr>
+            <p:cNvPr id="38" name="Straight Connector 37"/>
+            <p:cNvCxnSpPr/>
+            <p:nvPr/>
+          </p:nvCxnSpPr>
+          <p:spPr>
+            <a:xfrm>
+              <a:off x="8093356" y="4125950"/>
+              <a:ext cx="1003199" cy="15675"/>
+            </a:xfrm>
+            <a:prstGeom prst="line">
+              <a:avLst/>
+            </a:prstGeom>
+            <a:ln>
+              <a:solidFill>
+                <a:schemeClr val="bg1">
+                  <a:lumMod val="65000"/>
+                </a:schemeClr>
+              </a:solidFill>
+              <a:headEnd type="none"/>
+              <a:tailEnd type="none"/>
+            </a:ln>
+          </p:spPr>
+          <p:style>
+            <a:lnRef idx="1">
+              <a:schemeClr val="accent1"/>
+            </a:lnRef>
+            <a:fillRef idx="0">
+              <a:schemeClr val="accent1"/>
+            </a:fillRef>
+            <a:effectRef idx="0">
+              <a:schemeClr val="accent1"/>
+            </a:effectRef>
+            <a:fontRef idx="minor">
+              <a:schemeClr val="tx1"/>
+            </a:fontRef>
+          </p:style>
+        </p:cxnSp>
+        <p:cxnSp>
+          <p:nvCxnSpPr>
+            <p:cNvPr id="39" name="Straight Connector 38"/>
+            <p:cNvCxnSpPr/>
+            <p:nvPr/>
+          </p:nvCxnSpPr>
+          <p:spPr>
+            <a:xfrm>
+              <a:off x="8093356" y="4278243"/>
+              <a:ext cx="1003199" cy="15675"/>
+            </a:xfrm>
+            <a:prstGeom prst="line">
+              <a:avLst/>
+            </a:prstGeom>
+            <a:ln>
+              <a:solidFill>
+                <a:schemeClr val="bg1">
+                  <a:lumMod val="65000"/>
+                </a:schemeClr>
+              </a:solidFill>
+              <a:headEnd type="none"/>
+              <a:tailEnd type="none"/>
+            </a:ln>
+          </p:spPr>
+          <p:style>
+            <a:lnRef idx="1">
+              <a:schemeClr val="accent1"/>
+            </a:lnRef>
+            <a:fillRef idx="0">
+              <a:schemeClr val="accent1"/>
+            </a:fillRef>
+            <a:effectRef idx="0">
+              <a:schemeClr val="accent1"/>
+            </a:effectRef>
+            <a:fontRef idx="minor">
+              <a:schemeClr val="tx1"/>
+            </a:fontRef>
+          </p:style>
+        </p:cxnSp>
+        <p:cxnSp>
+          <p:nvCxnSpPr>
+            <p:cNvPr id="40" name="Straight Connector 39"/>
+            <p:cNvCxnSpPr/>
+            <p:nvPr/>
+          </p:nvCxnSpPr>
+          <p:spPr>
+            <a:xfrm>
+              <a:off x="8103469" y="4431657"/>
+              <a:ext cx="1003199" cy="15675"/>
+            </a:xfrm>
+            <a:prstGeom prst="line">
+              <a:avLst/>
+            </a:prstGeom>
+            <a:ln>
+              <a:solidFill>
+                <a:schemeClr val="bg1">
+                  <a:lumMod val="65000"/>
+                </a:schemeClr>
+              </a:solidFill>
+              <a:headEnd type="none"/>
+              <a:tailEnd type="none"/>
+            </a:ln>
+          </p:spPr>
+          <p:style>
+            <a:lnRef idx="1">
+              <a:schemeClr val="accent1"/>
+            </a:lnRef>
+            <a:fillRef idx="0">
+              <a:schemeClr val="accent1"/>
+            </a:fillRef>
+            <a:effectRef idx="0">
+              <a:schemeClr val="accent1"/>
+            </a:effectRef>
+            <a:fontRef idx="minor">
+              <a:schemeClr val="tx1"/>
+            </a:fontRef>
+          </p:style>
+        </p:cxnSp>
+        <p:cxnSp>
+          <p:nvCxnSpPr>
+            <p:cNvPr id="41" name="Straight Connector 40"/>
+            <p:cNvCxnSpPr/>
+            <p:nvPr/>
+          </p:nvCxnSpPr>
+          <p:spPr>
+            <a:xfrm>
+              <a:off x="8093355" y="4603696"/>
+              <a:ext cx="1003199" cy="15675"/>
+            </a:xfrm>
+            <a:prstGeom prst="line">
+              <a:avLst/>
+            </a:prstGeom>
+            <a:ln>
+              <a:solidFill>
+                <a:schemeClr val="bg1">
+                  <a:lumMod val="65000"/>
+                </a:schemeClr>
+              </a:solidFill>
+              <a:headEnd type="none"/>
+              <a:tailEnd type="none"/>
+            </a:ln>
+          </p:spPr>
+          <p:style>
+            <a:lnRef idx="1">
+              <a:schemeClr val="accent1"/>
+            </a:lnRef>
+            <a:fillRef idx="0">
+              <a:schemeClr val="accent1"/>
+            </a:fillRef>
+            <a:effectRef idx="0">
+              <a:schemeClr val="accent1"/>
+            </a:effectRef>
+            <a:fontRef idx="minor">
+              <a:schemeClr val="tx1"/>
+            </a:fontRef>
+          </p:style>
+        </p:cxnSp>
+        <p:cxnSp>
+          <p:nvCxnSpPr>
+            <p:cNvPr id="42" name="Straight Connector 41"/>
+            <p:cNvCxnSpPr/>
+            <p:nvPr/>
+          </p:nvCxnSpPr>
+          <p:spPr>
+            <a:xfrm>
+              <a:off x="8093354" y="4755989"/>
+              <a:ext cx="1003199" cy="15675"/>
+            </a:xfrm>
+            <a:prstGeom prst="line">
+              <a:avLst/>
+            </a:prstGeom>
+            <a:ln>
+              <a:solidFill>
+                <a:schemeClr val="bg1">
+                  <a:lumMod val="65000"/>
+                </a:schemeClr>
+              </a:solidFill>
+              <a:headEnd type="none"/>
+              <a:tailEnd type="none"/>
+            </a:ln>
+          </p:spPr>
+          <p:style>
+            <a:lnRef idx="1">
+              <a:schemeClr val="accent1"/>
+            </a:lnRef>
+            <a:fillRef idx="0">
+              <a:schemeClr val="accent1"/>
+            </a:fillRef>
+            <a:effectRef idx="0">
+              <a:schemeClr val="accent1"/>
+            </a:effectRef>
+            <a:fontRef idx="minor">
+              <a:schemeClr val="tx1"/>
+            </a:fontRef>
+          </p:style>
+        </p:cxnSp>
+        <p:cxnSp>
+          <p:nvCxnSpPr>
+            <p:cNvPr id="43" name="Straight Connector 42"/>
+            <p:cNvCxnSpPr/>
+            <p:nvPr/>
+          </p:nvCxnSpPr>
+          <p:spPr>
+            <a:xfrm>
+              <a:off x="8103469" y="4909403"/>
+              <a:ext cx="1003199" cy="15675"/>
+            </a:xfrm>
+            <a:prstGeom prst="line">
+              <a:avLst/>
+            </a:prstGeom>
+            <a:ln>
+              <a:solidFill>
+                <a:schemeClr val="bg1">
+                  <a:lumMod val="65000"/>
+                </a:schemeClr>
+              </a:solidFill>
+              <a:headEnd type="none"/>
+              <a:tailEnd type="none"/>
+            </a:ln>
+          </p:spPr>
+          <p:style>
+            <a:lnRef idx="1">
+              <a:schemeClr val="accent1"/>
+            </a:lnRef>
+            <a:fillRef idx="0">
+              <a:schemeClr val="accent1"/>
+            </a:fillRef>
+            <a:effectRef idx="0">
+              <a:schemeClr val="accent1"/>
+            </a:effectRef>
+            <a:fontRef idx="minor">
+              <a:schemeClr val="tx1"/>
+            </a:fontRef>
+          </p:style>
+        </p:cxnSp>
+        <p:cxnSp>
+          <p:nvCxnSpPr>
+            <p:cNvPr id="44" name="Straight Connector 43"/>
+            <p:cNvCxnSpPr/>
+            <p:nvPr/>
+          </p:nvCxnSpPr>
+          <p:spPr>
+            <a:xfrm>
+              <a:off x="8103468" y="5063246"/>
+              <a:ext cx="1003199" cy="15675"/>
+            </a:xfrm>
+            <a:prstGeom prst="line">
+              <a:avLst/>
+            </a:prstGeom>
+            <a:ln>
+              <a:solidFill>
+                <a:schemeClr val="bg1">
+                  <a:lumMod val="65000"/>
+                </a:schemeClr>
+              </a:solidFill>
+              <a:headEnd type="none"/>
+              <a:tailEnd type="none"/>
+            </a:ln>
+          </p:spPr>
+          <p:style>
+            <a:lnRef idx="1">
+              <a:schemeClr val="accent1"/>
+            </a:lnRef>
+            <a:fillRef idx="0">
+              <a:schemeClr val="accent1"/>
+            </a:fillRef>
+            <a:effectRef idx="0">
+              <a:schemeClr val="accent1"/>
+            </a:effectRef>
+            <a:fontRef idx="minor">
+              <a:schemeClr val="tx1"/>
+            </a:fontRef>
+          </p:style>
+        </p:cxnSp>
+        <p:cxnSp>
+          <p:nvCxnSpPr>
+            <p:cNvPr id="45" name="Straight Connector 44"/>
+            <p:cNvCxnSpPr/>
+            <p:nvPr/>
+          </p:nvCxnSpPr>
+          <p:spPr>
+            <a:xfrm>
+              <a:off x="8081806" y="5215947"/>
+              <a:ext cx="1003199" cy="15675"/>
+            </a:xfrm>
+            <a:prstGeom prst="line">
+              <a:avLst/>
+            </a:prstGeom>
+            <a:ln>
+              <a:solidFill>
+                <a:schemeClr val="bg1">
+                  <a:lumMod val="65000"/>
+                </a:schemeClr>
+              </a:solidFill>
+              <a:headEnd type="none"/>
+              <a:tailEnd type="none"/>
+            </a:ln>
+          </p:spPr>
+          <p:style>
+            <a:lnRef idx="1">
+              <a:schemeClr val="accent1"/>
+            </a:lnRef>
+            <a:fillRef idx="0">
+              <a:schemeClr val="accent1"/>
+            </a:fillRef>
+            <a:effectRef idx="0">
+              <a:schemeClr val="accent1"/>
+            </a:effectRef>
+            <a:fontRef idx="minor">
+              <a:schemeClr val="tx1"/>
+            </a:fontRef>
+          </p:style>
+        </p:cxnSp>
+        <p:cxnSp>
+          <p:nvCxnSpPr>
+            <p:cNvPr id="46" name="Straight Connector 45"/>
+            <p:cNvCxnSpPr/>
+            <p:nvPr/>
+          </p:nvCxnSpPr>
+          <p:spPr>
+            <a:xfrm>
+              <a:off x="9418994" y="4806075"/>
+              <a:ext cx="1003199" cy="15675"/>
+            </a:xfrm>
+            <a:prstGeom prst="line">
+              <a:avLst/>
+            </a:prstGeom>
+            <a:ln>
+              <a:solidFill>
+                <a:schemeClr val="bg1">
+                  <a:lumMod val="65000"/>
+                </a:schemeClr>
+              </a:solidFill>
+              <a:headEnd type="none"/>
+              <a:tailEnd type="none"/>
+            </a:ln>
+          </p:spPr>
+          <p:style>
+            <a:lnRef idx="1">
+              <a:schemeClr val="accent1"/>
+            </a:lnRef>
+            <a:fillRef idx="0">
+              <a:schemeClr val="accent1"/>
+            </a:fillRef>
+            <a:effectRef idx="0">
+              <a:schemeClr val="accent1"/>
+            </a:effectRef>
+            <a:fontRef idx="minor">
+              <a:schemeClr val="tx1"/>
+            </a:fontRef>
+          </p:style>
+        </p:cxnSp>
+        <p:cxnSp>
+          <p:nvCxnSpPr>
+            <p:cNvPr id="47" name="Straight Connector 46"/>
+            <p:cNvCxnSpPr/>
+            <p:nvPr/>
+          </p:nvCxnSpPr>
+          <p:spPr>
+            <a:xfrm>
+              <a:off x="9418994" y="4947568"/>
+              <a:ext cx="1003199" cy="15675"/>
+            </a:xfrm>
+            <a:prstGeom prst="line">
+              <a:avLst/>
+            </a:prstGeom>
+            <a:ln>
+              <a:solidFill>
+                <a:schemeClr val="bg1">
+                  <a:lumMod val="65000"/>
+                </a:schemeClr>
+              </a:solidFill>
+              <a:headEnd type="none"/>
+              <a:tailEnd type="none"/>
+            </a:ln>
+          </p:spPr>
+          <p:style>
+            <a:lnRef idx="1">
+              <a:schemeClr val="accent1"/>
+            </a:lnRef>
+            <a:fillRef idx="0">
+              <a:schemeClr val="accent1"/>
+            </a:fillRef>
+            <a:effectRef idx="0">
+              <a:schemeClr val="accent1"/>
+            </a:effectRef>
+            <a:fontRef idx="minor">
+              <a:schemeClr val="tx1"/>
+            </a:fontRef>
+          </p:style>
+        </p:cxnSp>
+        <p:cxnSp>
+          <p:nvCxnSpPr>
+            <p:cNvPr id="48" name="Straight Connector 47"/>
+            <p:cNvCxnSpPr/>
+            <p:nvPr/>
+          </p:nvCxnSpPr>
+          <p:spPr>
+            <a:xfrm>
+              <a:off x="9418994" y="5099864"/>
+              <a:ext cx="1003199" cy="15675"/>
+            </a:xfrm>
+            <a:prstGeom prst="line">
+              <a:avLst/>
+            </a:prstGeom>
+            <a:ln>
+              <a:solidFill>
+                <a:schemeClr val="bg1">
+                  <a:lumMod val="65000"/>
+                </a:schemeClr>
+              </a:solidFill>
+              <a:headEnd type="none"/>
+              <a:tailEnd type="none"/>
+            </a:ln>
+          </p:spPr>
+          <p:style>
+            <a:lnRef idx="1">
+              <a:schemeClr val="accent1"/>
+            </a:lnRef>
+            <a:fillRef idx="0">
+              <a:schemeClr val="accent1"/>
+            </a:fillRef>
+            <a:effectRef idx="0">
+              <a:schemeClr val="accent1"/>
+            </a:effectRef>
+            <a:fontRef idx="minor">
+              <a:schemeClr val="tx1"/>
+            </a:fontRef>
+          </p:style>
+        </p:cxnSp>
+        <p:cxnSp>
+          <p:nvCxnSpPr>
+            <p:cNvPr id="49" name="Straight Connector 48"/>
+            <p:cNvCxnSpPr/>
+            <p:nvPr/>
+          </p:nvCxnSpPr>
+          <p:spPr>
+            <a:xfrm>
+              <a:off x="9418994" y="5251344"/>
+              <a:ext cx="1003199" cy="15675"/>
+            </a:xfrm>
+            <a:prstGeom prst="line">
+              <a:avLst/>
+            </a:prstGeom>
+            <a:ln>
+              <a:solidFill>
+                <a:schemeClr val="bg1">
+                  <a:lumMod val="65000"/>
+                </a:schemeClr>
+              </a:solidFill>
+              <a:headEnd type="none"/>
+              <a:tailEnd type="none"/>
+            </a:ln>
+          </p:spPr>
+          <p:style>
+            <a:lnRef idx="1">
+              <a:schemeClr val="accent1"/>
+            </a:lnRef>
+            <a:fillRef idx="0">
+              <a:schemeClr val="accent1"/>
+            </a:fillRef>
+            <a:effectRef idx="0">
+              <a:schemeClr val="accent1"/>
+            </a:effectRef>
+            <a:fontRef idx="minor">
+              <a:schemeClr val="tx1"/>
+            </a:fontRef>
+          </p:style>
+        </p:cxnSp>
+        <p:sp>
+          <p:nvSpPr>
+            <p:cNvPr id="50" name="TextBox 49"/>
+            <p:cNvSpPr txBox="1"/>
+            <p:nvPr/>
+          </p:nvSpPr>
+          <p:spPr>
+            <a:xfrm>
+              <a:off x="9418839" y="3925222"/>
+              <a:ext cx="807272" cy="107722"/>
+            </a:xfrm>
+            <a:prstGeom prst="rect">
+              <a:avLst/>
+            </a:prstGeom>
+            <a:noFill/>
+          </p:spPr>
+          <p:txBody>
+            <a:bodyPr wrap="none" lIns="0" tIns="0" rIns="0" bIns="0" rtlCol="0">
+              <a:spAutoFit/>
+            </a:bodyPr>
+            <a:lstStyle/>
+            <a:p>
+              <a:r>
+                <a:rPr lang="en-US" sz="700" spc="-70" dirty="0" smtClean="0"/>
+                <a:t>Reply </a:t>
+              </a:r>
+              <a:r>
+                <a:rPr lang="fi-FI" sz="700" spc="-70" dirty="0" smtClean="0"/>
+                <a:t>| </a:t>
+              </a:r>
+              <a:r>
+                <a:rPr lang="en-US" sz="700" spc="-70" dirty="0"/>
+                <a:t> </a:t>
+              </a:r>
+              <a:r>
+                <a:rPr lang="en-US" sz="700" spc="-70" dirty="0" smtClean="0"/>
+                <a:t>Reply All </a:t>
+              </a:r>
+              <a:r>
+                <a:rPr lang="fi-FI" sz="700" spc="-70" dirty="0" smtClean="0"/>
+                <a:t>| </a:t>
+              </a:r>
+              <a:r>
+                <a:rPr lang="en-US" sz="700" spc="-70" dirty="0" smtClean="0"/>
+                <a:t> Forward</a:t>
+              </a:r>
+            </a:p>
+          </p:txBody>
+        </p:sp>
+        <p:sp>
+          <p:nvSpPr>
+            <p:cNvPr id="51" name="Rectangle 50"/>
+            <p:cNvSpPr/>
+            <p:nvPr/>
+          </p:nvSpPr>
+          <p:spPr>
+            <a:xfrm>
+              <a:off x="9418994" y="4071701"/>
+              <a:ext cx="1091689" cy="97048"/>
+            </a:xfrm>
+            <a:prstGeom prst="rect">
+              <a:avLst/>
+            </a:prstGeom>
+            <a:solidFill>
+              <a:schemeClr val="bg2"/>
+            </a:solidFill>
+            <a:ln w="19050">
+              <a:solidFill>
+                <a:schemeClr val="bg2"/>
+              </a:solidFill>
+            </a:ln>
+          </p:spPr>
+          <p:txBody>
+            <a:bodyPr vert="horz" lIns="0" tIns="0" rIns="0" bIns="0" rtlCol="0" anchor="ctr">
+              <a:noAutofit/>
+            </a:bodyPr>
+            <a:lstStyle/>
+            <a:p>
+              <a:pPr algn="ctr" defTabSz="761183">
+                <a:spcBef>
+                  <a:spcPct val="20000"/>
+                </a:spcBef>
+              </a:pPr>
+              <a:endParaRPr lang="en-US" sz="1400" kern="0" spc="-67" dirty="0">
+                <a:latin typeface="Segoe UI Light"/>
+                <a:ea typeface="Segoe UI" pitchFamily="34" charset="0"/>
+                <a:cs typeface="Segoe UI" pitchFamily="34" charset="0"/>
+              </a:endParaRPr>
+            </a:p>
+          </p:txBody>
+        </p:sp>
+        <p:sp>
+          <p:nvSpPr>
+            <p:cNvPr id="52" name="Rectangle 51"/>
+            <p:cNvSpPr/>
+            <p:nvPr/>
+          </p:nvSpPr>
+          <p:spPr>
+            <a:xfrm>
+              <a:off x="9418994" y="4071701"/>
+              <a:ext cx="267931" cy="97048"/>
+            </a:xfrm>
+            <a:prstGeom prst="rect">
+              <a:avLst/>
+            </a:prstGeom>
+            <a:solidFill>
+              <a:schemeClr val="bg1"/>
+            </a:solidFill>
+            <a:ln w="19050">
+              <a:solidFill>
+                <a:srgbClr val="4D4D4D">
+                  <a:lumMod val="40000"/>
+                  <a:lumOff val="60000"/>
+                </a:srgbClr>
+              </a:solidFill>
+            </a:ln>
+          </p:spPr>
+          <p:txBody>
+            <a:bodyPr vert="horz" lIns="0" tIns="0" rIns="0" bIns="0" rtlCol="0" anchor="ctr">
+              <a:noAutofit/>
+            </a:bodyPr>
+            <a:lstStyle/>
+            <a:p>
+              <a:pPr algn="ctr" defTabSz="761183">
+                <a:spcBef>
+                  <a:spcPct val="20000"/>
+                </a:spcBef>
+              </a:pPr>
+              <a:r>
+                <a:rPr lang="en-US" sz="600" kern="0" spc="-67" dirty="0" smtClean="0">
+                  <a:latin typeface="Segoe UI Light"/>
+                  <a:ea typeface="Segoe UI" pitchFamily="34" charset="0"/>
+                  <a:cs typeface="Segoe UI" pitchFamily="34" charset="0"/>
+                </a:rPr>
+                <a:t>app</a:t>
+              </a:r>
+              <a:endParaRPr lang="en-US" sz="600" kern="0" spc="-67" dirty="0">
+                <a:latin typeface="Segoe UI Light"/>
+                <a:ea typeface="Segoe UI" pitchFamily="34" charset="0"/>
+                <a:cs typeface="Segoe UI" pitchFamily="34" charset="0"/>
+              </a:endParaRPr>
+            </a:p>
+          </p:txBody>
+        </p:sp>
+        <p:sp>
+          <p:nvSpPr>
+            <p:cNvPr id="53" name="TextBox 52"/>
+            <p:cNvSpPr txBox="1"/>
+            <p:nvPr/>
+          </p:nvSpPr>
+          <p:spPr>
+            <a:xfrm>
+              <a:off x="9418839" y="4648267"/>
+              <a:ext cx="464551" cy="107722"/>
+            </a:xfrm>
+            <a:prstGeom prst="rect">
+              <a:avLst/>
+            </a:prstGeom>
+            <a:noFill/>
+          </p:spPr>
+          <p:txBody>
+            <a:bodyPr wrap="none" lIns="0" tIns="0" rIns="0" bIns="0" rtlCol="0">
+              <a:spAutoFit/>
+            </a:bodyPr>
+            <a:lstStyle/>
+            <a:p>
+              <a:r>
+                <a:rPr lang="en-US" sz="700" spc="-70" dirty="0" smtClean="0"/>
+                <a:t>Message Body</a:t>
+              </a:r>
+            </a:p>
+          </p:txBody>
+        </p:sp>
         <p:pic>
           <p:nvPicPr>
-            <p:cNvPr id="3074" name="Picture 2"/>
+            <p:cNvPr id="54" name="Picture 53"/>
             <p:cNvPicPr>
-              <a:picLocks noChangeAspect="1" noChangeArrowheads="1"/>
+              <a:picLocks noChangeAspect="1"/>
             </p:cNvPicPr>
             <p:nvPr/>
           </p:nvPicPr>
-          <p:blipFill>
+          <p:blipFill rotWithShape="1">
             <a:blip r:embed="rId3">
               <a:extLst>
                 <a:ext uri="{28A0092B-C50C-407E-A947-70E740481C1C}">
@@ -30543,63 +32514,28 @@
                 </a:ext>
               </a:extLst>
             </a:blip>
-            <a:srcRect/>
-            <a:stretch>
-              <a:fillRect/>
-            </a:stretch>
+            <a:srcRect r="50340"/>
+            <a:stretch/>
           </p:blipFill>
-          <p:spPr bwMode="auto">
+          <p:spPr>
             <a:xfrm>
-              <a:off x="659720" y="3937907"/>
-              <a:ext cx="2705100" cy="2247900"/>
+              <a:off x="1174855" y="3135231"/>
+              <a:ext cx="441960" cy="455456"/>
             </a:xfrm>
             <a:prstGeom prst="rect">
               <a:avLst/>
             </a:prstGeom>
-            <a:noFill/>
-            <a:ln>
-              <a:noFill/>
-            </a:ln>
-            <a:effectLst/>
-            <a:extLst>
-              <a:ext uri="{909E8E84-426E-40DD-AFC4-6F175D3DCCD1}">
-                <a14:hiddenFill xmlns:a14="http://schemas.microsoft.com/office/drawing/2010/main">
-                  <a:solidFill>
-                    <a:schemeClr val="accent1"/>
-                  </a:solidFill>
-                </a14:hiddenFill>
-              </a:ext>
-              <a:ext uri="{91240B29-F687-4F45-9708-019B960494DF}">
-                <a14:hiddenLine xmlns:a14="http://schemas.microsoft.com/office/drawing/2010/main" w="9525">
-                  <a:solidFill>
-                    <a:schemeClr val="tx1"/>
-                  </a:solidFill>
-                  <a:miter lim="800000"/>
-                  <a:headEnd/>
-                  <a:tailEnd/>
-                </a14:hiddenLine>
-              </a:ext>
-              <a:ext uri="{AF507438-7753-43E0-B8FC-AC1667EBCBE1}">
-                <a14:hiddenEffects xmlns:a14="http://schemas.microsoft.com/office/drawing/2010/main">
-                  <a:effectLst>
-                    <a:outerShdw dist="35921" dir="2700000" algn="ctr" rotWithShape="0">
-                      <a:schemeClr val="bg2"/>
-                    </a:outerShdw>
-                  </a:effectLst>
-                </a14:hiddenEffects>
-              </a:ext>
-            </a:extLst>
           </p:spPr>
         </p:pic>
         <p:pic>
           <p:nvPicPr>
-            <p:cNvPr id="3075" name="Picture 3"/>
+            <p:cNvPr id="55" name="Picture 54"/>
             <p:cNvPicPr>
-              <a:picLocks noChangeAspect="1" noChangeArrowheads="1"/>
+              <a:picLocks noChangeAspect="1"/>
             </p:cNvPicPr>
             <p:nvPr/>
           </p:nvPicPr>
-          <p:blipFill>
+          <p:blipFill rotWithShape="1">
             <a:blip r:embed="rId4">
               <a:extLst>
                 <a:ext uri="{28A0092B-C50C-407E-A947-70E740481C1C}">
@@ -30607,63 +32543,28 @@
                 </a:ext>
               </a:extLst>
             </a:blip>
-            <a:srcRect/>
-            <a:stretch>
-              <a:fillRect/>
-            </a:stretch>
+            <a:srcRect r="46952"/>
+            <a:stretch/>
           </p:blipFill>
-          <p:spPr bwMode="auto">
+          <p:spPr>
             <a:xfrm>
-              <a:off x="3664178" y="3937907"/>
-              <a:ext cx="2705100" cy="2247900"/>
+              <a:off x="4540571" y="3123472"/>
+              <a:ext cx="451444" cy="465551"/>
             </a:xfrm>
             <a:prstGeom prst="rect">
               <a:avLst/>
             </a:prstGeom>
-            <a:noFill/>
-            <a:ln>
-              <a:noFill/>
-            </a:ln>
-            <a:effectLst/>
-            <a:extLst>
-              <a:ext uri="{909E8E84-426E-40DD-AFC4-6F175D3DCCD1}">
-                <a14:hiddenFill xmlns:a14="http://schemas.microsoft.com/office/drawing/2010/main">
-                  <a:solidFill>
-                    <a:schemeClr val="accent1"/>
-                  </a:solidFill>
-                </a14:hiddenFill>
-              </a:ext>
-              <a:ext uri="{91240B29-F687-4F45-9708-019B960494DF}">
-                <a14:hiddenLine xmlns:a14="http://schemas.microsoft.com/office/drawing/2010/main" w="9525">
-                  <a:solidFill>
-                    <a:schemeClr val="tx1"/>
-                  </a:solidFill>
-                  <a:miter lim="800000"/>
-                  <a:headEnd/>
-                  <a:tailEnd/>
-                </a14:hiddenLine>
-              </a:ext>
-              <a:ext uri="{AF507438-7753-43E0-B8FC-AC1667EBCBE1}">
-                <a14:hiddenEffects xmlns:a14="http://schemas.microsoft.com/office/drawing/2010/main">
-                  <a:effectLst>
-                    <a:outerShdw dist="35921" dir="2700000" algn="ctr" rotWithShape="0">
-                      <a:schemeClr val="bg2"/>
-                    </a:outerShdw>
-                  </a:effectLst>
-                </a14:hiddenEffects>
-              </a:ext>
-            </a:extLst>
           </p:spPr>
         </p:pic>
         <p:pic>
           <p:nvPicPr>
-            <p:cNvPr id="3076" name="Picture 4"/>
+            <p:cNvPr id="56" name="Picture 55"/>
             <p:cNvPicPr>
-              <a:picLocks noChangeAspect="1" noChangeArrowheads="1"/>
+              <a:picLocks noChangeAspect="1"/>
             </p:cNvPicPr>
             <p:nvPr/>
           </p:nvPicPr>
-          <p:blipFill>
+          <p:blipFill rotWithShape="1">
             <a:blip r:embed="rId5">
               <a:extLst>
                 <a:ext uri="{28A0092B-C50C-407E-A947-70E740481C1C}">
@@ -30671,52 +32572,17 @@
                 </a:ext>
               </a:extLst>
             </a:blip>
-            <a:srcRect/>
-            <a:stretch>
-              <a:fillRect/>
-            </a:stretch>
+            <a:srcRect r="64717"/>
+            <a:stretch/>
           </p:blipFill>
-          <p:spPr bwMode="auto">
+          <p:spPr>
             <a:xfrm>
-              <a:off x="6625092" y="3937907"/>
-              <a:ext cx="2705100" cy="2247900"/>
+              <a:off x="7809665" y="3052077"/>
+              <a:ext cx="587605" cy="626979"/>
             </a:xfrm>
             <a:prstGeom prst="rect">
               <a:avLst/>
             </a:prstGeom>
-            <a:noFill/>
-            <a:ln>
-              <a:noFill/>
-            </a:ln>
-            <a:effectLst/>
-            <a:extLst>
-              <a:ext uri="{909E8E84-426E-40DD-AFC4-6F175D3DCCD1}">
-                <a14:hiddenFill xmlns:a14="http://schemas.microsoft.com/office/drawing/2010/main">
-                  <a:solidFill>
-                    <a:schemeClr val="accent1"/>
-                  </a:solidFill>
-                </a14:hiddenFill>
-              </a:ext>
-              <a:ext uri="{91240B29-F687-4F45-9708-019B960494DF}">
-                <a14:hiddenLine xmlns:a14="http://schemas.microsoft.com/office/drawing/2010/main" w="9525">
-                  <a:solidFill>
-                    <a:schemeClr val="tx1"/>
-                  </a:solidFill>
-                  <a:miter lim="800000"/>
-                  <a:headEnd/>
-                  <a:tailEnd/>
-                </a14:hiddenLine>
-              </a:ext>
-              <a:ext uri="{AF507438-7753-43E0-B8FC-AC1667EBCBE1}">
-                <a14:hiddenEffects xmlns:a14="http://schemas.microsoft.com/office/drawing/2010/main">
-                  <a:effectLst>
-                    <a:outerShdw dist="35921" dir="2700000" algn="ctr" rotWithShape="0">
-                      <a:schemeClr val="bg2"/>
-                    </a:outerShdw>
-                  </a:effectLst>
-                </a14:hiddenEffects>
-              </a:ext>
-            </a:extLst>
           </p:spPr>
         </p:pic>
       </p:grpSp>
@@ -30730,11 +32596,11 @@
   <p:clrMapOvr>
     <a:masterClrMapping/>
   </p:clrMapOvr>
-  <mc:AlternateContent xmlns:mc="http://schemas.openxmlformats.org/markup-compatibility/2006">
-    <mc:Choice xmlns:p14="http://schemas.microsoft.com/office/powerpoint/2010/main" Requires="p14">
+  <mc:AlternateContent xmlns:mc="http://schemas.openxmlformats.org/markup-compatibility/2006" xmlns:p14="http://schemas.microsoft.com/office/powerpoint/2010/main">
+    <mc:Choice Requires="p14">
       <p:transition p14:dur="0"/>
     </mc:Choice>
-    <mc:Fallback>
+    <mc:Fallback xmlns="">
       <p:transition/>
     </mc:Fallback>
   </mc:AlternateContent>
@@ -30860,19 +32726,7 @@
             </a:r>
             <a:r>
               <a:rPr lang="en-US" sz="3599" dirty="0" smtClean="0"/>
-              <a:t>provides </a:t>
-            </a:r>
-            <a:r>
-              <a:rPr lang="en-US" sz="3599" dirty="0" smtClean="0"/>
-              <a:t>secure runtime </a:t>
-            </a:r>
-            <a:r>
-              <a:rPr lang="en-US" sz="3599" dirty="0" smtClean="0"/>
-              <a:t>environment for </a:t>
-            </a:r>
-            <a:r>
-              <a:rPr lang="en-US" sz="3599" dirty="0" smtClean="0"/>
-              <a:t>Apps</a:t>
+              <a:t>provides secure runtime environment for Apps</a:t>
             </a:r>
             <a:endParaRPr lang="en-US" sz="3599" b="1" dirty="0">
               <a:solidFill>
@@ -30923,11 +32777,11 @@
   <p:clrMapOvr>
     <a:masterClrMapping/>
   </p:clrMapOvr>
-  <mc:AlternateContent xmlns:mc="http://schemas.openxmlformats.org/markup-compatibility/2006">
-    <mc:Choice xmlns:p14="http://schemas.microsoft.com/office/powerpoint/2010/main" Requires="p14">
+  <mc:AlternateContent xmlns:mc="http://schemas.openxmlformats.org/markup-compatibility/2006" xmlns:p14="http://schemas.microsoft.com/office/powerpoint/2010/main">
+    <mc:Choice Requires="p14">
       <p:transition p14:dur="0"/>
     </mc:Choice>
-    <mc:Fallback>
+    <mc:Fallback xmlns="">
       <p:transition/>
     </mc:Fallback>
   </mc:AlternateContent>
@@ -31041,21 +32895,21 @@
       </p:sp>
       <p:grpSp>
         <p:nvGrpSpPr>
-          <p:cNvPr id="8" name="Group 7"/>
+          <p:cNvPr id="23" name="Group 22"/>
           <p:cNvGrpSpPr/>
           <p:nvPr/>
         </p:nvGrpSpPr>
         <p:grpSpPr>
           <a:xfrm>
-            <a:off x="2296070" y="3488761"/>
-            <a:ext cx="7596685" cy="2811349"/>
-            <a:chOff x="-204092" y="2267256"/>
-            <a:chExt cx="7598664" cy="2812081"/>
+            <a:off x="2064127" y="3583742"/>
+            <a:ext cx="7598664" cy="2381305"/>
+            <a:chOff x="-204092" y="2698032"/>
+            <a:chExt cx="7598664" cy="2381305"/>
           </a:xfrm>
         </p:grpSpPr>
         <p:pic>
           <p:nvPicPr>
-            <p:cNvPr id="9" name="Picture 8"/>
+            <p:cNvPr id="24" name="Picture 23"/>
             <p:cNvPicPr>
               <a:picLocks noChangeAspect="1"/>
             </p:cNvPicPr>
@@ -31092,7 +32946,7 @@
         </p:pic>
         <p:grpSp>
           <p:nvGrpSpPr>
-            <p:cNvPr id="10" name="Group 9"/>
+            <p:cNvPr id="25" name="Group 24"/>
             <p:cNvGrpSpPr/>
             <p:nvPr/>
           </p:nvGrpSpPr>
@@ -31106,7 +32960,7 @@
           </p:grpSpPr>
           <p:sp>
             <p:nvSpPr>
-              <p:cNvPr id="21" name="Rectangle 20"/>
+              <p:cNvPr id="31" name="Rectangle 30"/>
               <p:cNvSpPr/>
               <p:nvPr/>
             </p:nvSpPr>
@@ -31142,7 +32996,7 @@
               <a:bodyPr rtlCol="0" anchor="ctr"/>
               <a:lstStyle/>
               <a:p>
-                <a:pPr algn="ctr" defTabSz="760955"/>
+                <a:pPr algn="ctr" defTabSz="761183"/>
                 <a:endParaRPr lang="en-US" sz="1500" kern="0">
                   <a:solidFill>
                     <a:srgbClr val="1B1B1B"/>
@@ -31154,7 +33008,7 @@
           </p:sp>
           <p:sp>
             <p:nvSpPr>
-              <p:cNvPr id="22" name="Rectangle 21"/>
+              <p:cNvPr id="32" name="Rectangle 31"/>
               <p:cNvSpPr/>
               <p:nvPr/>
             </p:nvSpPr>
@@ -31184,7 +33038,7 @@
               <a:bodyPr rtlCol="0" anchor="ctr"/>
               <a:lstStyle/>
               <a:p>
-                <a:pPr algn="ctr" defTabSz="760955"/>
+                <a:pPr algn="ctr" defTabSz="761183"/>
                 <a:endParaRPr lang="en-US" sz="1166" kern="0" dirty="0">
                   <a:solidFill>
                     <a:srgbClr val="262626">
@@ -31200,7 +33054,7 @@
         </p:grpSp>
         <p:sp>
           <p:nvSpPr>
-            <p:cNvPr id="11" name="Rectangle 10"/>
+            <p:cNvPr id="26" name="Rectangle 25"/>
             <p:cNvSpPr/>
             <p:nvPr/>
           </p:nvSpPr>
@@ -31224,12 +33078,12 @@
             <a:effectLst/>
           </p:spPr>
           <p:txBody>
-            <a:bodyPr lIns="47566" tIns="23782" rIns="47566" bIns="23782" rtlCol="0" anchor="ctr"/>
+            <a:bodyPr lIns="47578" tIns="23788" rIns="47578" bIns="23788" rtlCol="0" anchor="ctr"/>
             <a:lstStyle/>
             <a:p>
-              <a:pPr algn="ctr" defTabSz="760955"/>
+              <a:pPr algn="ctr" defTabSz="761183"/>
               <a:r>
-                <a:rPr lang="en-US" sz="1166" kern="0" dirty="0">
+                <a:rPr lang="en-US" sz="1166" kern="0" dirty="0" smtClean="0">
                   <a:solidFill>
                     <a:srgbClr val="1B1B1B"/>
                   </a:solidFill>
@@ -31237,9 +33091,15 @@
                 </a:rPr>
                 <a:t>App for Office</a:t>
               </a:r>
+              <a:endParaRPr lang="en-US" sz="1166" kern="0" dirty="0">
+                <a:solidFill>
+                  <a:srgbClr val="1B1B1B"/>
+                </a:solidFill>
+                <a:latin typeface="Segoe UI"/>
+              </a:endParaRPr>
             </a:p>
             <a:p>
-              <a:pPr algn="ctr" defTabSz="760955"/>
+              <a:pPr algn="ctr" defTabSz="761183"/>
               <a:r>
                 <a:rPr lang="en-US" sz="1166" kern="0" dirty="0">
                   <a:solidFill>
@@ -31251,7 +33111,7 @@
               </a:r>
             </a:p>
             <a:p>
-              <a:pPr algn="ctr" defTabSz="760955"/>
+              <a:pPr algn="ctr" defTabSz="761183"/>
               <a:endParaRPr lang="en-US" sz="1166" kern="0" dirty="0">
                 <a:solidFill>
                   <a:srgbClr val="1B1B1B"/>
@@ -31260,11 +33120,11 @@
               </a:endParaRPr>
             </a:p>
             <a:p>
-              <a:pPr algn="ctr" defTabSz="760955"/>
+              <a:pPr algn="ctr" defTabSz="761183"/>
               <a:r>
                 <a:rPr lang="en-US" sz="833" b="1" kern="0" dirty="0">
                   <a:solidFill>
-                    <a:srgbClr val="FF7401"/>
+                    <a:schemeClr val="tx2"/>
                   </a:solidFill>
                   <a:latin typeface="Segoe UI"/>
                 </a:rPr>
@@ -31275,7 +33135,7 @@
         </p:sp>
         <p:sp>
           <p:nvSpPr>
-            <p:cNvPr id="12" name="Rectangle 11"/>
+            <p:cNvPr id="27" name="Rectangle 26"/>
             <p:cNvSpPr/>
             <p:nvPr/>
           </p:nvSpPr>
@@ -31299,10 +33159,10 @@
             <a:effectLst/>
           </p:spPr>
           <p:txBody>
-            <a:bodyPr lIns="47566" tIns="23782" rIns="47566" bIns="23782" rtlCol="0" anchor="ctr"/>
+            <a:bodyPr lIns="47578" tIns="23788" rIns="47578" bIns="23788" rtlCol="0" anchor="ctr"/>
             <a:lstStyle/>
             <a:p>
-              <a:pPr algn="ctr" defTabSz="760955"/>
+              <a:pPr algn="ctr" defTabSz="761183"/>
               <a:r>
                 <a:rPr lang="en-US" sz="1166" kern="0" dirty="0">
                   <a:solidFill>
@@ -31314,7 +33174,7 @@
               </a:r>
             </a:p>
             <a:p>
-              <a:pPr algn="ctr" defTabSz="760955"/>
+              <a:pPr algn="ctr" defTabSz="761183"/>
               <a:r>
                 <a:rPr lang="en-US" sz="1166" kern="0" dirty="0">
                   <a:solidFill>
@@ -31326,7 +33186,7 @@
               </a:r>
             </a:p>
             <a:p>
-              <a:pPr algn="ctr" defTabSz="760955"/>
+              <a:pPr algn="ctr" defTabSz="761183"/>
               <a:endParaRPr lang="en-US" sz="833" b="1" kern="0" dirty="0">
                 <a:solidFill>
                   <a:srgbClr val="FF7401"/>
@@ -31335,11 +33195,11 @@
               </a:endParaRPr>
             </a:p>
             <a:p>
-              <a:pPr algn="ctr" defTabSz="760955"/>
+              <a:pPr algn="ctr" defTabSz="761183"/>
               <a:r>
                 <a:rPr lang="en-US" sz="833" b="1" kern="0" dirty="0">
                   <a:solidFill>
-                    <a:srgbClr val="FF7401"/>
+                    <a:schemeClr val="tx2"/>
                   </a:solidFill>
                   <a:latin typeface="Segoe UI"/>
                 </a:rPr>
@@ -31350,7 +33210,7 @@
         </p:sp>
         <p:sp>
           <p:nvSpPr>
-            <p:cNvPr id="13" name="Cross 12"/>
+            <p:cNvPr id="28" name="Cross 27"/>
             <p:cNvSpPr/>
             <p:nvPr/>
           </p:nvSpPr>
@@ -31374,10 +33234,10 @@
             <a:effectLst/>
           </p:spPr>
           <p:txBody>
-            <a:bodyPr lIns="47566" tIns="23782" rIns="47566" bIns="23782" rtlCol="0" anchor="ctr"/>
+            <a:bodyPr lIns="47578" tIns="23788" rIns="47578" bIns="23788" rtlCol="0" anchor="ctr"/>
             <a:lstStyle/>
             <a:p>
-              <a:pPr algn="ctr" defTabSz="760955"/>
+              <a:pPr algn="ctr" defTabSz="761183"/>
               <a:endParaRPr lang="en-US" sz="1500" kern="0">
                 <a:solidFill>
                   <a:srgbClr val="FFFFFF"/>
@@ -31389,7 +33249,7 @@
         </p:sp>
         <p:sp>
           <p:nvSpPr>
-            <p:cNvPr id="14" name="Equal 13"/>
+            <p:cNvPr id="29" name="Equal 28"/>
             <p:cNvSpPr/>
             <p:nvPr/>
           </p:nvSpPr>
@@ -31416,10 +33276,10 @@
             <a:effectLst/>
           </p:spPr>
           <p:txBody>
-            <a:bodyPr lIns="47566" tIns="23782" rIns="47566" bIns="23782" rtlCol="0" anchor="ctr"/>
+            <a:bodyPr lIns="47578" tIns="23788" rIns="47578" bIns="23788" rtlCol="0" anchor="ctr"/>
             <a:lstStyle/>
             <a:p>
-              <a:pPr algn="ctr" defTabSz="760955"/>
+              <a:pPr algn="ctr" defTabSz="761183"/>
               <a:endParaRPr lang="en-US" sz="1500" kern="0">
                 <a:solidFill>
                   <a:srgbClr val="1B1B1B"/>
@@ -31429,177 +33289,9 @@
             </a:p>
           </p:txBody>
         </p:sp>
-        <p:pic>
-          <p:nvPicPr>
-            <p:cNvPr id="15" name="Picture 14"/>
-            <p:cNvPicPr>
-              <a:picLocks noChangeAspect="1"/>
-            </p:cNvPicPr>
-            <p:nvPr/>
-          </p:nvPicPr>
-          <p:blipFill>
-            <a:blip r:embed="rId4" cstate="print">
-              <a:extLst>
-                <a:ext uri="{28A0092B-C50C-407E-A947-70E740481C1C}">
-                  <a14:useLocalDpi xmlns:a14="http://schemas.microsoft.com/office/drawing/2010/main" val="0"/>
-                </a:ext>
-              </a:extLst>
-            </a:blip>
-            <a:stretch>
-              <a:fillRect/>
-            </a:stretch>
-          </p:blipFill>
-          <p:spPr>
-            <a:xfrm>
-              <a:off x="2803761" y="2775126"/>
-              <a:ext cx="663059" cy="781743"/>
-            </a:xfrm>
-            <a:prstGeom prst="rect">
-              <a:avLst/>
-            </a:prstGeom>
-          </p:spPr>
-        </p:pic>
-        <p:pic>
-          <p:nvPicPr>
-            <p:cNvPr id="16" name="Picture 15"/>
-            <p:cNvPicPr>
-              <a:picLocks noChangeAspect="1"/>
-            </p:cNvPicPr>
-            <p:nvPr/>
-          </p:nvPicPr>
-          <p:blipFill>
-            <a:blip r:embed="rId5" cstate="print">
-              <a:extLst>
-                <a:ext uri="{28A0092B-C50C-407E-A947-70E740481C1C}">
-                  <a14:useLocalDpi xmlns:a14="http://schemas.microsoft.com/office/drawing/2010/main" val="0"/>
-                </a:ext>
-              </a:extLst>
-            </a:blip>
-            <a:stretch>
-              <a:fillRect/>
-            </a:stretch>
-          </p:blipFill>
-          <p:spPr>
-            <a:xfrm>
-              <a:off x="1006267" y="2739053"/>
-              <a:ext cx="676500" cy="799632"/>
-            </a:xfrm>
-            <a:prstGeom prst="rect">
-              <a:avLst/>
-            </a:prstGeom>
-          </p:spPr>
-        </p:pic>
         <p:sp>
           <p:nvSpPr>
-            <p:cNvPr id="17" name="TextBox 16"/>
-            <p:cNvSpPr txBox="1"/>
-            <p:nvPr/>
-          </p:nvSpPr>
-          <p:spPr>
-            <a:xfrm>
-              <a:off x="587206" y="2267256"/>
-              <a:ext cx="1645202" cy="435669"/>
-            </a:xfrm>
-            <a:prstGeom prst="rect">
-              <a:avLst/>
-            </a:prstGeom>
-            <a:noFill/>
-          </p:spPr>
-          <p:txBody>
-            <a:bodyPr wrap="square" lIns="76099" tIns="38045" rIns="76099" bIns="38045" rtlCol="0">
-              <a:spAutoFit/>
-            </a:bodyPr>
-            <a:lstStyle/>
-            <a:p>
-              <a:pPr algn="ctr" defTabSz="760955"/>
-              <a:r>
-                <a:rPr lang="en-US" sz="1166" kern="0" dirty="0">
-                  <a:solidFill>
-                    <a:srgbClr val="595959"/>
-                  </a:solidFill>
-                </a:rPr>
-                <a:t>App for Office </a:t>
-              </a:r>
-            </a:p>
-            <a:p>
-              <a:pPr algn="ctr" defTabSz="760955"/>
-              <a:r>
-                <a:rPr lang="en-US" sz="1166" kern="0" dirty="0">
-                  <a:solidFill>
-                    <a:srgbClr val="595959"/>
-                  </a:solidFill>
-                </a:rPr>
-                <a:t>Catalog Server</a:t>
-              </a:r>
-            </a:p>
-          </p:txBody>
-        </p:sp>
-        <p:sp>
-          <p:nvSpPr>
-            <p:cNvPr id="18" name="TextBox 17"/>
-            <p:cNvSpPr txBox="1"/>
-            <p:nvPr/>
-          </p:nvSpPr>
-          <p:spPr>
-            <a:xfrm>
-              <a:off x="2712836" y="2457706"/>
-              <a:ext cx="1360592" cy="256261"/>
-            </a:xfrm>
-            <a:prstGeom prst="rect">
-              <a:avLst/>
-            </a:prstGeom>
-            <a:noFill/>
-          </p:spPr>
-          <p:txBody>
-            <a:bodyPr wrap="square" lIns="76099" tIns="38045" rIns="76099" bIns="38045" rtlCol="0">
-              <a:spAutoFit/>
-            </a:bodyPr>
-            <a:lstStyle/>
-            <a:p>
-              <a:pPr defTabSz="760955"/>
-              <a:r>
-                <a:rPr lang="en-US" sz="1166" kern="0" dirty="0">
-                  <a:solidFill>
-                    <a:srgbClr val="595959"/>
-                  </a:solidFill>
-                </a:rPr>
-                <a:t>Web Server</a:t>
-              </a:r>
-            </a:p>
-          </p:txBody>
-        </p:sp>
-        <p:pic>
-          <p:nvPicPr>
-            <p:cNvPr id="19" name="Picture 18"/>
-            <p:cNvPicPr>
-              <a:picLocks noChangeAspect="1"/>
-            </p:cNvPicPr>
-            <p:nvPr/>
-          </p:nvPicPr>
-          <p:blipFill rotWithShape="1">
-            <a:blip r:embed="rId6" cstate="print">
-              <a:extLst>
-                <a:ext uri="{28A0092B-C50C-407E-A947-70E740481C1C}">
-                  <a14:useLocalDpi xmlns:a14="http://schemas.microsoft.com/office/drawing/2010/main" val="0"/>
-                </a:ext>
-              </a:extLst>
-            </a:blip>
-            <a:srcRect/>
-            <a:stretch/>
-          </p:blipFill>
-          <p:spPr>
-            <a:xfrm>
-              <a:off x="5299470" y="2735748"/>
-              <a:ext cx="1281318" cy="416356"/>
-            </a:xfrm>
-            <a:prstGeom prst="rect">
-              <a:avLst/>
-            </a:prstGeom>
-          </p:spPr>
-        </p:pic>
-        <p:sp>
-          <p:nvSpPr>
-            <p:cNvPr id="20" name="Rectangle 19"/>
+            <p:cNvPr id="30" name="Rectangle 29"/>
             <p:cNvSpPr/>
             <p:nvPr/>
           </p:nvSpPr>
@@ -31626,15 +33318,15 @@
             </a:bodyPr>
             <a:lstStyle/>
             <a:p>
-              <a:pPr algn="ctr" defTabSz="760955">
+              <a:pPr algn="ctr" defTabSz="761183">
                 <a:spcBef>
                   <a:spcPct val="20000"/>
                 </a:spcBef>
               </a:pPr>
               <a:r>
-                <a:rPr lang="en-US" sz="2332" kern="0" spc="-67" dirty="0">
+                <a:rPr lang="en-US" sz="2333" kern="0" spc="-67" dirty="0" smtClean="0">
                   <a:solidFill>
-                    <a:srgbClr val="FF7401"/>
+                    <a:schemeClr val="tx2"/>
                   </a:solidFill>
                   <a:latin typeface="Segoe UI Light"/>
                   <a:ea typeface="Segoe UI" pitchFamily="34" charset="0"/>
@@ -31642,6 +33334,14 @@
                 </a:rPr>
                 <a:t>App for Office</a:t>
               </a:r>
+              <a:endParaRPr lang="en-US" sz="2333" kern="0" spc="-67" dirty="0">
+                <a:solidFill>
+                  <a:schemeClr val="tx2"/>
+                </a:solidFill>
+                <a:latin typeface="Segoe UI Light"/>
+                <a:ea typeface="Segoe UI" pitchFamily="34" charset="0"/>
+                <a:cs typeface="Segoe UI" pitchFamily="34" charset="0"/>
+              </a:endParaRPr>
             </a:p>
           </p:txBody>
         </p:sp>
@@ -31656,11 +33356,11 @@
   <p:clrMapOvr>
     <a:masterClrMapping/>
   </p:clrMapOvr>
-  <mc:AlternateContent xmlns:mc="http://schemas.openxmlformats.org/markup-compatibility/2006">
-    <mc:Choice xmlns:p14="http://schemas.microsoft.com/office/powerpoint/2010/main" Requires="p14">
+  <mc:AlternateContent xmlns:mc="http://schemas.openxmlformats.org/markup-compatibility/2006" xmlns:p14="http://schemas.microsoft.com/office/powerpoint/2010/main">
+    <mc:Choice Requires="p14">
       <p:transition p14:dur="0"/>
     </mc:Choice>
-    <mc:Fallback>
+    <mc:Fallback xmlns="">
       <p:transition/>
     </mc:Fallback>
   </mc:AlternateContent>
@@ -33275,6 +34975,12 @@
 </file>
 
 <file path=customXml/item1.xml><?xml version="1.0" encoding="utf-8"?>
+<p:properties xmlns:p="http://schemas.microsoft.com/office/2006/metadata/properties" xmlns:xsi="http://www.w3.org/2001/XMLSchema-instance" xmlns:pc="http://schemas.microsoft.com/office/infopath/2007/PartnerControls">
+  <documentManagement/>
+</p:properties>
+</file>
+
+<file path=customXml/item2.xml><?xml version="1.0" encoding="utf-8"?>
 <?mso-contentType ?>
 <FormTemplates xmlns="http://schemas.microsoft.com/sharepoint/v3/contenttype/forms">
   <Display>DocumentLibraryForm</Display>
@@ -33283,7 +34989,7 @@
 </FormTemplates>
 </file>
 
-<file path=customXml/item2.xml><?xml version="1.0" encoding="utf-8"?>
+<file path=customXml/item3.xml><?xml version="1.0" encoding="utf-8"?>
 <ct:contentTypeSchema xmlns:ct="http://schemas.microsoft.com/office/2006/metadata/contentType" xmlns:ma="http://schemas.microsoft.com/office/2006/metadata/properties/metaAttributes" ct:_="" ma:_="" ma:contentTypeName="Document" ma:contentTypeID="0x010100A2E4C90AA7333249A7DBC8CC6F49919B" ma:contentTypeVersion="1" ma:contentTypeDescription="Create a new document." ma:contentTypeScope="" ma:versionID="e7b09f0f38d7ed30c7da14951e97abcc">
   <xsd:schema xmlns:xsd="http://www.w3.org/2001/XMLSchema" xmlns:xs="http://www.w3.org/2001/XMLSchema" xmlns:p="http://schemas.microsoft.com/office/2006/metadata/properties" xmlns:ns2="5fad15d0-477e-40da-a20d-40d4ca777cbd" targetNamespace="http://schemas.microsoft.com/office/2006/metadata/properties" ma:root="true" ma:fieldsID="0cee24db179c30c5ebec40b677cadf70" ns2:_="">
     <xsd:import namespace="5fad15d0-477e-40da-a20d-40d4ca777cbd"/>
@@ -33423,13 +35129,23 @@
 </ct:contentTypeSchema>
 </file>
 
-<file path=customXml/item3.xml><?xml version="1.0" encoding="utf-8"?>
-<p:properties xmlns:p="http://schemas.microsoft.com/office/2006/metadata/properties" xmlns:xsi="http://www.w3.org/2001/XMLSchema-instance" xmlns:pc="http://schemas.microsoft.com/office/infopath/2007/PartnerControls">
-  <documentManagement/>
-</p:properties>
+<file path=customXml/itemProps1.xml><?xml version="1.0" encoding="utf-8"?>
+<ds:datastoreItem xmlns:ds="http://schemas.openxmlformats.org/officeDocument/2006/customXml" ds:itemID="{DA593625-DB14-4FB0-B5A9-3269FA9C120B}">
+  <ds:schemaRefs>
+    <ds:schemaRef ds:uri="http://www.w3.org/XML/1998/namespace"/>
+    <ds:schemaRef ds:uri="http://schemas.microsoft.com/office/2006/documentManagement/types"/>
+    <ds:schemaRef ds:uri="http://schemas.microsoft.com/office/infopath/2007/PartnerControls"/>
+    <ds:schemaRef ds:uri="http://purl.org/dc/dcmitype/"/>
+    <ds:schemaRef ds:uri="http://purl.org/dc/elements/1.1/"/>
+    <ds:schemaRef ds:uri="http://schemas.microsoft.com/office/2006/metadata/properties"/>
+    <ds:schemaRef ds:uri="http://schemas.openxmlformats.org/package/2006/metadata/core-properties"/>
+    <ds:schemaRef ds:uri="http://purl.org/dc/terms/"/>
+    <ds:schemaRef ds:uri="5fad15d0-477e-40da-a20d-40d4ca777cbd"/>
+  </ds:schemaRefs>
+</ds:datastoreItem>
 </file>
 
-<file path=customXml/itemProps1.xml><?xml version="1.0" encoding="utf-8"?>
+<file path=customXml/itemProps2.xml><?xml version="1.0" encoding="utf-8"?>
 <ds:datastoreItem xmlns:ds="http://schemas.openxmlformats.org/officeDocument/2006/customXml" ds:itemID="{E1E0CE18-CA03-4891-9CD8-3448778E3D53}">
   <ds:schemaRefs>
     <ds:schemaRef ds:uri="http://schemas.microsoft.com/sharepoint/v3/contenttype/forms"/>
@@ -33437,7 +35153,7 @@
 </ds:datastoreItem>
 </file>
 
-<file path=customXml/itemProps2.xml><?xml version="1.0" encoding="utf-8"?>
+<file path=customXml/itemProps3.xml><?xml version="1.0" encoding="utf-8"?>
 <ds:datastoreItem xmlns:ds="http://schemas.openxmlformats.org/officeDocument/2006/customXml" ds:itemID="{F17DCE38-6787-497B-B958-75817420EB1E}">
   <ds:schemaRefs>
     <ds:schemaRef ds:uri="http://schemas.microsoft.com/office/2006/metadata/contentType"/>
@@ -33453,20 +35169,4 @@
     <ds:schemaRef ds:uri="http://schemas.microsoft.com/internal/obd"/>
   </ds:schemaRefs>
 </ds:datastoreItem>
-</file>
-
-<file path=customXml/itemProps3.xml><?xml version="1.0" encoding="utf-8"?>
-<ds:datastoreItem xmlns:ds="http://schemas.openxmlformats.org/officeDocument/2006/customXml" ds:itemID="{DA593625-DB14-4FB0-B5A9-3269FA9C120B}">
-  <ds:schemaRefs>
-    <ds:schemaRef ds:uri="http://www.w3.org/XML/1998/namespace"/>
-    <ds:schemaRef ds:uri="http://schemas.microsoft.com/office/2006/documentManagement/types"/>
-    <ds:schemaRef ds:uri="http://schemas.microsoft.com/office/infopath/2007/PartnerControls"/>
-    <ds:schemaRef ds:uri="http://purl.org/dc/dcmitype/"/>
-    <ds:schemaRef ds:uri="http://purl.org/dc/elements/1.1/"/>
-    <ds:schemaRef ds:uri="http://schemas.microsoft.com/office/2006/metadata/properties"/>
-    <ds:schemaRef ds:uri="http://schemas.openxmlformats.org/package/2006/metadata/core-properties"/>
-    <ds:schemaRef ds:uri="http://purl.org/dc/terms/"/>
-    <ds:schemaRef ds:uri="5fad15d0-477e-40da-a20d-40d4ca777cbd"/>
-  </ds:schemaRefs>
-</ds:datastoreItem>
 </file>
</xml_diff>